<commit_message>
change major bar chart with vales
</commit_message>
<xml_diff>
--- a/Group_5_Presentation.pptx
+++ b/Group_5_Presentation.pptx
@@ -127,6 +127,32 @@
 </p:presentation>
 </file>
 
+<file path=ppt/commentAuthors.xml><?xml version="1.0" encoding="utf-8"?>
+<p:cmAuthorLst xmlns:a="http://schemas.openxmlformats.org/drawingml/2006/main" xmlns:r="http://schemas.openxmlformats.org/officeDocument/2006/relationships" xmlns:p="http://schemas.openxmlformats.org/presentationml/2006/main">
+  <p:cmAuthor id="1" name="Lei Qin" initials="LQ" lastIdx="1" clrIdx="0">
+    <p:extLst>
+      <p:ext uri="{19B8F6BF-5375-455C-9EA6-DF929625EA0E}">
+        <p15:presenceInfo xmlns:p15="http://schemas.microsoft.com/office/powerpoint/2012/main" userId="S::lqb975@ads.northwestern.edu::ce3c0625-0c65-4a1b-a4c9-5f50b0d6be35" providerId="AD"/>
+      </p:ext>
+    </p:extLst>
+  </p:cmAuthor>
+</p:cmAuthorLst>
+</file>
+
+<file path=ppt/comments/comment1.xml><?xml version="1.0" encoding="utf-8"?>
+<p:cmLst xmlns:a="http://schemas.openxmlformats.org/drawingml/2006/main" xmlns:r="http://schemas.openxmlformats.org/officeDocument/2006/relationships" xmlns:p="http://schemas.openxmlformats.org/presentationml/2006/main">
+  <p:cm authorId="1" dt="2019-03-31T23:41:48.002" idx="1">
+    <p:pos x="10" y="10"/>
+    <p:text>Hi Winnie, I like the table, it gave clear read out. How do you think about making the line thicker? and about not showing the grid? I feel the lines might come out more outstanding that way.</p:text>
+    <p:extLst>
+      <p:ext uri="{C676402C-5697-4E1C-873F-D02D1690AC5C}">
+        <p15:threadingInfo xmlns:p15="http://schemas.microsoft.com/office/powerpoint/2012/main" timeZoneBias="300"/>
+      </p:ext>
+    </p:extLst>
+  </p:cm>
+</p:cmLst>
+</file>
+
 <file path=ppt/slideLayouts/slideLayout1.xml><?xml version="1.0" encoding="utf-8"?>
 <p:sldLayout xmlns:a="http://schemas.openxmlformats.org/drawingml/2006/main" xmlns:r="http://schemas.openxmlformats.org/officeDocument/2006/relationships" xmlns:p="http://schemas.openxmlformats.org/presentationml/2006/main" type="title" preserve="1">
   <p:cSld name="Title Slide">
@@ -297,7 +323,7 @@
           <a:p>
             <a:fld id="{5DEA3F82-8CB4-4B0C-B6BE-1390C73654E0}" type="datetimeFigureOut">
               <a:rPr lang="en-US" smtClean="0"/>
-              <a:t>3/31/2019</a:t>
+              <a:t>3/31/19</a:t>
             </a:fld>
             <a:endParaRPr lang="en-US"/>
           </a:p>
@@ -564,7 +590,7 @@
           <a:p>
             <a:fld id="{5DEA3F82-8CB4-4B0C-B6BE-1390C73654E0}" type="datetimeFigureOut">
               <a:rPr lang="en-US" smtClean="0"/>
-              <a:t>3/31/2019</a:t>
+              <a:t>3/31/19</a:t>
             </a:fld>
             <a:endParaRPr lang="en-US"/>
           </a:p>
@@ -795,7 +821,7 @@
           <a:p>
             <a:fld id="{5DEA3F82-8CB4-4B0C-B6BE-1390C73654E0}" type="datetimeFigureOut">
               <a:rPr lang="en-US" smtClean="0"/>
-              <a:t>3/31/2019</a:t>
+              <a:t>3/31/19</a:t>
             </a:fld>
             <a:endParaRPr lang="en-US"/>
           </a:p>
@@ -1105,7 +1131,7 @@
           <a:p>
             <a:fld id="{5DEA3F82-8CB4-4B0C-B6BE-1390C73654E0}" type="datetimeFigureOut">
               <a:rPr lang="en-US" smtClean="0"/>
-              <a:t>3/31/2019</a:t>
+              <a:t>3/31/19</a:t>
             </a:fld>
             <a:endParaRPr lang="en-US"/>
           </a:p>
@@ -1578,7 +1604,7 @@
           <a:p>
             <a:fld id="{5DEA3F82-8CB4-4B0C-B6BE-1390C73654E0}" type="datetimeFigureOut">
               <a:rPr lang="en-US" smtClean="0"/>
-              <a:t>3/31/2019</a:t>
+              <a:t>3/31/19</a:t>
             </a:fld>
             <a:endParaRPr lang="en-US"/>
           </a:p>
@@ -2125,7 +2151,7 @@
           <a:p>
             <a:fld id="{5DEA3F82-8CB4-4B0C-B6BE-1390C73654E0}" type="datetimeFigureOut">
               <a:rPr lang="en-US" smtClean="0"/>
-              <a:t>3/31/2019</a:t>
+              <a:t>3/31/19</a:t>
             </a:fld>
             <a:endParaRPr lang="en-US"/>
           </a:p>
@@ -2899,7 +2925,7 @@
           <a:p>
             <a:fld id="{5DEA3F82-8CB4-4B0C-B6BE-1390C73654E0}" type="datetimeFigureOut">
               <a:rPr lang="en-US" smtClean="0"/>
-              <a:t>3/31/2019</a:t>
+              <a:t>3/31/19</a:t>
             </a:fld>
             <a:endParaRPr lang="en-US"/>
           </a:p>
@@ -3074,7 +3100,7 @@
           <a:p>
             <a:fld id="{5DEA3F82-8CB4-4B0C-B6BE-1390C73654E0}" type="datetimeFigureOut">
               <a:rPr lang="en-US" smtClean="0"/>
-              <a:t>3/31/2019</a:t>
+              <a:t>3/31/19</a:t>
             </a:fld>
             <a:endParaRPr lang="en-US"/>
           </a:p>
@@ -3297,7 +3323,7 @@
           <a:p>
             <a:fld id="{5DEA3F82-8CB4-4B0C-B6BE-1390C73654E0}" type="datetimeFigureOut">
               <a:rPr lang="en-US" smtClean="0"/>
-              <a:t>3/31/2019</a:t>
+              <a:t>3/31/19</a:t>
             </a:fld>
             <a:endParaRPr lang="en-US"/>
           </a:p>
@@ -3477,7 +3503,7 @@
           <a:p>
             <a:fld id="{5DEA3F82-8CB4-4B0C-B6BE-1390C73654E0}" type="datetimeFigureOut">
               <a:rPr lang="en-US" smtClean="0"/>
-              <a:t>3/31/2019</a:t>
+              <a:t>3/31/19</a:t>
             </a:fld>
             <a:endParaRPr lang="en-US"/>
           </a:p>
@@ -3766,7 +3792,7 @@
           <a:p>
             <a:fld id="{5DEA3F82-8CB4-4B0C-B6BE-1390C73654E0}" type="datetimeFigureOut">
               <a:rPr lang="en-US" smtClean="0"/>
-              <a:t>3/31/2019</a:t>
+              <a:t>3/31/19</a:t>
             </a:fld>
             <a:endParaRPr lang="en-US"/>
           </a:p>
@@ -4008,7 +4034,7 @@
           <a:p>
             <a:fld id="{5DEA3F82-8CB4-4B0C-B6BE-1390C73654E0}" type="datetimeFigureOut">
               <a:rPr lang="en-US" smtClean="0"/>
-              <a:t>3/31/2019</a:t>
+              <a:t>3/31/19</a:t>
             </a:fld>
             <a:endParaRPr lang="en-US"/>
           </a:p>
@@ -4387,7 +4413,7 @@
           <a:p>
             <a:fld id="{5DEA3F82-8CB4-4B0C-B6BE-1390C73654E0}" type="datetimeFigureOut">
               <a:rPr lang="en-US" smtClean="0"/>
-              <a:t>3/31/2019</a:t>
+              <a:t>3/31/19</a:t>
             </a:fld>
             <a:endParaRPr lang="en-US"/>
           </a:p>
@@ -4505,7 +4531,7 @@
           <a:p>
             <a:fld id="{5DEA3F82-8CB4-4B0C-B6BE-1390C73654E0}" type="datetimeFigureOut">
               <a:rPr lang="en-US" smtClean="0"/>
-              <a:t>3/31/2019</a:t>
+              <a:t>3/31/19</a:t>
             </a:fld>
             <a:endParaRPr lang="en-US"/>
           </a:p>
@@ -4600,7 +4626,7 @@
           <a:p>
             <a:fld id="{5DEA3F82-8CB4-4B0C-B6BE-1390C73654E0}" type="datetimeFigureOut">
               <a:rPr lang="en-US" smtClean="0"/>
-              <a:t>3/31/2019</a:t>
+              <a:t>3/31/19</a:t>
             </a:fld>
             <a:endParaRPr lang="en-US"/>
           </a:p>
@@ -4849,7 +4875,7 @@
           <a:p>
             <a:fld id="{5DEA3F82-8CB4-4B0C-B6BE-1390C73654E0}" type="datetimeFigureOut">
               <a:rPr lang="en-US" smtClean="0"/>
-              <a:t>3/31/2019</a:t>
+              <a:t>3/31/19</a:t>
             </a:fld>
             <a:endParaRPr lang="en-US"/>
           </a:p>
@@ -5106,7 +5132,7 @@
           <a:p>
             <a:fld id="{5DEA3F82-8CB4-4B0C-B6BE-1390C73654E0}" type="datetimeFigureOut">
               <a:rPr lang="en-US" smtClean="0"/>
-              <a:t>3/31/2019</a:t>
+              <a:t>3/31/19</a:t>
             </a:fld>
             <a:endParaRPr lang="en-US"/>
           </a:p>
@@ -5349,7 +5375,7 @@
           <a:p>
             <a:fld id="{5DEA3F82-8CB4-4B0C-B6BE-1390C73654E0}" type="datetimeFigureOut">
               <a:rPr lang="en-US" smtClean="0"/>
-              <a:t>3/31/2019</a:t>
+              <a:t>3/31/19</a:t>
             </a:fld>
             <a:endParaRPr lang="en-US"/>
           </a:p>
@@ -5819,7 +5845,7 @@
           <p:cNvPr id="4" name="TextBox 3">
             <a:extLst>
               <a:ext uri="{FF2B5EF4-FFF2-40B4-BE49-F238E27FC236}">
-                <a16:creationId xmlns="" xmlns:a16="http://schemas.microsoft.com/office/drawing/2014/main" id="{FCF9FFDB-DB25-4AFA-B506-312075D34380}"/>
+                <a16:creationId xmlns:a16="http://schemas.microsoft.com/office/drawing/2014/main" id="{FCF9FFDB-DB25-4AFA-B506-312075D34380}"/>
               </a:ext>
             </a:extLst>
           </p:cNvPr>
@@ -5904,7 +5930,7 @@
           <p:cNvPr id="2" name="Title 1">
             <a:extLst>
               <a:ext uri="{FF2B5EF4-FFF2-40B4-BE49-F238E27FC236}">
-                <a16:creationId xmlns="" xmlns:a16="http://schemas.microsoft.com/office/drawing/2014/main" id="{EC0D6666-CF76-4F9D-B356-8C4E5E1D8BE9}"/>
+                <a16:creationId xmlns:a16="http://schemas.microsoft.com/office/drawing/2014/main" id="{EC0D6666-CF76-4F9D-B356-8C4E5E1D8BE9}"/>
               </a:ext>
             </a:extLst>
           </p:cNvPr>
@@ -5929,27 +5955,22 @@
           <a:p>
             <a:r>
               <a:rPr lang="en-US" sz="3400" dirty="0"/>
-              <a:t>The employment status in Computer and Mathematical Occupation in </a:t>
-            </a:r>
-            <a:r>
-              <a:rPr lang="en-US" sz="3400" dirty="0" smtClean="0"/>
-              <a:t>US: 2017</a:t>
-            </a:r>
-            <a:endParaRPr lang="en-US" sz="3400" dirty="0"/>
+              <a:t>The employment status in Computer and Mathematical Occupation in US: 2017</a:t>
+            </a:r>
           </a:p>
         </p:txBody>
       </p:sp>
       <p:pic>
         <p:nvPicPr>
-          <p:cNvPr id="4098" name="Picture 2">
+          <p:cNvPr id="4" name="Picture 3" descr="A screenshot of a cell phone&#10;&#10;Description automatically generated">
             <a:extLst>
               <a:ext uri="{FF2B5EF4-FFF2-40B4-BE49-F238E27FC236}">
-                <a16:creationId xmlns="" xmlns:a16="http://schemas.microsoft.com/office/drawing/2014/main" id="{B9FF63C9-ACF4-465C-BC1B-055E493546A8}"/>
+                <a16:creationId xmlns:a16="http://schemas.microsoft.com/office/drawing/2014/main" id="{86BFFD9D-DAAD-1B49-B1E8-4F81EF330F24}"/>
               </a:ext>
             </a:extLst>
           </p:cNvPr>
           <p:cNvPicPr>
-            <a:picLocks noChangeAspect="1" noChangeArrowheads="1"/>
+            <a:picLocks noChangeAspect="1"/>
           </p:cNvPicPr>
           <p:nvPr/>
         </p:nvPicPr>
@@ -5961,29 +5982,18 @@
               </a:ext>
             </a:extLst>
           </a:blip>
-          <a:srcRect/>
           <a:stretch>
             <a:fillRect/>
           </a:stretch>
         </p:blipFill>
-        <p:spPr bwMode="auto">
-          <a:xfrm>
-            <a:off x="4051300" y="764373"/>
-            <a:ext cx="7543800" cy="5943600"/>
+        <p:spPr>
+          <a:xfrm>
+            <a:off x="3998272" y="402336"/>
+            <a:ext cx="8193728" cy="6455664"/>
           </a:xfrm>
           <a:prstGeom prst="rect">
             <a:avLst/>
           </a:prstGeom>
-          <a:noFill/>
-          <a:extLst>
-            <a:ext uri="{909E8E84-426E-40DD-AFC4-6F175D3DCCD1}">
-              <a14:hiddenFill xmlns:a14="http://schemas.microsoft.com/office/drawing/2010/main">
-                <a:solidFill>
-                  <a:srgbClr val="FFFFFF"/>
-                </a:solidFill>
-              </a14:hiddenFill>
-            </a:ext>
-          </a:extLst>
         </p:spPr>
       </p:pic>
     </p:spTree>
@@ -6021,7 +6031,7 @@
           <p:cNvPr id="2" name="Title 1">
             <a:extLst>
               <a:ext uri="{FF2B5EF4-FFF2-40B4-BE49-F238E27FC236}">
-                <a16:creationId xmlns="" xmlns:a16="http://schemas.microsoft.com/office/drawing/2014/main" id="{1CFEA6E0-9345-1C43-9594-047B355EECDF}"/>
+                <a16:creationId xmlns:a16="http://schemas.microsoft.com/office/drawing/2014/main" id="{1CFEA6E0-9345-1C43-9594-047B355EECDF}"/>
               </a:ext>
             </a:extLst>
           </p:cNvPr>
@@ -6039,10 +6049,6 @@
           </a:bodyPr>
           <a:lstStyle/>
           <a:p>
-            <a:r>
-              <a:rPr lang="en-US" dirty="0"/>
-              <a:t/>
-            </a:r>
             <a:br>
               <a:rPr lang="en-US" dirty="0"/>
             </a:br>
@@ -6088,7 +6094,7 @@
 </file>
 
 <file path=ppt/slides/slide12.xml><?xml version="1.0" encoding="utf-8"?>
-<p:sld xmlns:a="http://schemas.openxmlformats.org/drawingml/2006/main" xmlns:r="http://schemas.openxmlformats.org/officeDocument/2006/relationships" xmlns:p="http://schemas.openxmlformats.org/presentationml/2006/main">
+<p:sld xmlns:a="http://schemas.openxmlformats.org/drawingml/2006/main" xmlns:r="http://schemas.openxmlformats.org/officeDocument/2006/relationships" xmlns:p="http://schemas.openxmlformats.org/presentationml/2006/main" show="0">
   <p:cSld>
     <p:spTree>
       <p:nvGrpSpPr>
@@ -6109,7 +6115,7 @@
           <p:cNvPr id="2" name="Title 1">
             <a:extLst>
               <a:ext uri="{FF2B5EF4-FFF2-40B4-BE49-F238E27FC236}">
-                <a16:creationId xmlns="" xmlns:a16="http://schemas.microsoft.com/office/drawing/2014/main" id="{27E5E4B7-0D24-1246-B992-4E761C8D9010}"/>
+                <a16:creationId xmlns:a16="http://schemas.microsoft.com/office/drawing/2014/main" id="{27E5E4B7-0D24-1246-B992-4E761C8D9010}"/>
               </a:ext>
             </a:extLst>
           </p:cNvPr>
@@ -6137,7 +6143,7 @@
           <p:cNvPr id="3" name="Content Placeholder 2">
             <a:extLst>
               <a:ext uri="{FF2B5EF4-FFF2-40B4-BE49-F238E27FC236}">
-                <a16:creationId xmlns="" xmlns:a16="http://schemas.microsoft.com/office/drawing/2014/main" id="{F68D2FE6-AC37-FA4F-B071-B1D2CB6CF5FE}"/>
+                <a16:creationId xmlns:a16="http://schemas.microsoft.com/office/drawing/2014/main" id="{F68D2FE6-AC37-FA4F-B071-B1D2CB6CF5FE}"/>
               </a:ext>
             </a:extLst>
           </p:cNvPr>
@@ -6169,14 +6175,14 @@
             <a:pPr lvl="1"/>
             <a:r>
               <a:rPr lang="en-US" dirty="0"/>
-              <a:t>Nation level top 3: administrative Support, sales and food preparation and serving</a:t>
+              <a:t>Nation level top 3: administrative support, sales and food preparation and serving</a:t>
             </a:r>
           </a:p>
           <a:p>
             <a:pPr lvl="1"/>
             <a:r>
               <a:rPr lang="en-US" dirty="0"/>
-              <a:t>Computer and Mathematical occupations rank No. 14 among 22 major occupation categories </a:t>
+              <a:t>Computer and Mathematical occupations ranks No. 14 among 22 major occupation categories </a:t>
             </a:r>
           </a:p>
           <a:p>
@@ -6257,7 +6263,7 @@
           <p:cNvPr id="2" name="Title 1">
             <a:extLst>
               <a:ext uri="{FF2B5EF4-FFF2-40B4-BE49-F238E27FC236}">
-                <a16:creationId xmlns="" xmlns:a16="http://schemas.microsoft.com/office/drawing/2014/main" id="{21D3167F-30A9-4F8D-99EE-386A1F094613}"/>
+                <a16:creationId xmlns:a16="http://schemas.microsoft.com/office/drawing/2014/main" id="{21D3167F-30A9-4F8D-99EE-386A1F094613}"/>
               </a:ext>
             </a:extLst>
           </p:cNvPr>
@@ -6274,10 +6280,9 @@
           <a:lstStyle/>
           <a:p>
             <a:r>
-              <a:rPr lang="en-US" dirty="0" smtClean="0"/>
+              <a:rPr lang="en-US" dirty="0"/>
               <a:t>TAKE-AWAYS</a:t>
             </a:r>
-            <a:endParaRPr lang="en-US" dirty="0"/>
           </a:p>
         </p:txBody>
       </p:sp>
@@ -6286,7 +6291,7 @@
           <p:cNvPr id="3" name="Content Placeholder 2">
             <a:extLst>
               <a:ext uri="{FF2B5EF4-FFF2-40B4-BE49-F238E27FC236}">
-                <a16:creationId xmlns="" xmlns:a16="http://schemas.microsoft.com/office/drawing/2014/main" id="{571BA543-3A3F-43F0-957D-37B7A83B0853}"/>
+                <a16:creationId xmlns:a16="http://schemas.microsoft.com/office/drawing/2014/main" id="{571BA543-3A3F-43F0-957D-37B7A83B0853}"/>
               </a:ext>
             </a:extLst>
           </p:cNvPr>
@@ -6310,156 +6315,72 @@
           <a:lstStyle/>
           <a:p>
             <a:r>
-              <a:rPr lang="en-US" sz="2400" dirty="0" smtClean="0"/>
-              <a:t>Fastest </a:t>
-            </a:r>
-            <a:r>
               <a:rPr lang="en-US" sz="2400" dirty="0"/>
-              <a:t>YOY growth for 2017 vs </a:t>
-            </a:r>
-            <a:r>
-              <a:rPr lang="en-US" sz="2400" dirty="0" smtClean="0"/>
-              <a:t>2016: </a:t>
-            </a:r>
-            <a:r>
-              <a:rPr lang="en-US" sz="2400" b="1" dirty="0" smtClean="0"/>
+              <a:t>Fastest YOY growth for 2017 vs 2016: </a:t>
+            </a:r>
+            <a:r>
+              <a:rPr lang="en-US" sz="2400" b="1" dirty="0"/>
               <a:t>Guam</a:t>
             </a:r>
           </a:p>
           <a:p>
             <a:r>
-              <a:rPr lang="en-US" sz="2400" dirty="0" smtClean="0"/>
-              <a:t>Slowest </a:t>
-            </a:r>
-            <a:r>
               <a:rPr lang="en-US" sz="2400" dirty="0"/>
-              <a:t>YOY growth for 2017 vs </a:t>
-            </a:r>
-            <a:r>
-              <a:rPr lang="en-US" sz="2400" dirty="0" smtClean="0"/>
-              <a:t>2016: </a:t>
-            </a:r>
-            <a:r>
-              <a:rPr lang="en-US" sz="2400" b="1" dirty="0" smtClean="0"/>
+              <a:t>Slowest YOY growth for 2017 vs 2016: </a:t>
+            </a:r>
+            <a:r>
+              <a:rPr lang="en-US" sz="2400" b="1" dirty="0"/>
               <a:t>Louisiana</a:t>
             </a:r>
           </a:p>
           <a:p>
             <a:r>
-              <a:rPr lang="en-US" sz="2400" dirty="0" smtClean="0"/>
-              <a:t>Larger </a:t>
-            </a:r>
-            <a:r>
               <a:rPr lang="en-US" sz="2400" dirty="0"/>
-              <a:t>population did </a:t>
-            </a:r>
-            <a:r>
-              <a:rPr lang="en-US" sz="2400" dirty="0" smtClean="0"/>
-              <a:t>not mean higher </a:t>
-            </a:r>
+              <a:t>Larger population did not mean higher job growth</a:t>
+            </a:r>
+          </a:p>
+          <a:p>
             <a:r>
               <a:rPr lang="en-US" sz="2400" dirty="0"/>
-              <a:t>job </a:t>
-            </a:r>
-            <a:r>
-              <a:rPr lang="en-US" sz="2400" dirty="0" smtClean="0"/>
-              <a:t>growth</a:t>
-            </a:r>
-          </a:p>
-          <a:p>
-            <a:r>
-              <a:rPr lang="en-US" sz="2400" dirty="0" smtClean="0"/>
-              <a:t>Occupation </a:t>
-            </a:r>
+              <a:t>Occupation with fastest YOY growth for 2017 vs 2016 : </a:t>
+            </a:r>
+            <a:r>
+              <a:rPr lang="en-US" sz="2400" b="1" dirty="0"/>
+              <a:t>Computer Occupations, All Other</a:t>
+            </a:r>
+          </a:p>
+          <a:p>
             <a:r>
               <a:rPr lang="en-US" sz="2400" dirty="0"/>
-              <a:t>with </a:t>
-            </a:r>
-            <a:r>
-              <a:rPr lang="en-US" sz="2400" dirty="0" smtClean="0"/>
-              <a:t>fastest </a:t>
-            </a:r>
+              <a:t>Occupation with slowest YOY growth for 2017 vs 2016 : </a:t>
+            </a:r>
+            <a:r>
+              <a:rPr lang="en-US" sz="2400" b="1" dirty="0"/>
+              <a:t>Computer Programmers</a:t>
+            </a:r>
+          </a:p>
+          <a:p>
             <a:r>
               <a:rPr lang="en-US" sz="2400" dirty="0"/>
-              <a:t>YOY growth for 2017 vs 2016 </a:t>
-            </a:r>
-            <a:r>
-              <a:rPr lang="en-US" sz="2400" dirty="0" smtClean="0"/>
-              <a:t>: </a:t>
+              <a:t>Computer and Mathematical Occupations is </a:t>
             </a:r>
             <a:r>
               <a:rPr lang="en-US" sz="2400" b="1" dirty="0"/>
-              <a:t>Computer Occupations, All </a:t>
-            </a:r>
-            <a:r>
-              <a:rPr lang="en-US" sz="2400" b="1" dirty="0" smtClean="0"/>
-              <a:t>Other</a:t>
-            </a:r>
-          </a:p>
-          <a:p>
+              <a:t>14</a:t>
+            </a:r>
+            <a:r>
+              <a:rPr lang="en-US" sz="2400" b="1" baseline="30000" dirty="0"/>
+              <a:t>th</a:t>
+            </a:r>
             <a:r>
               <a:rPr lang="en-US" sz="2400" dirty="0"/>
-              <a:t>Occupation with </a:t>
-            </a:r>
-            <a:r>
-              <a:rPr lang="en-US" sz="2400" dirty="0" smtClean="0"/>
-              <a:t>slowest </a:t>
-            </a:r>
+              <a:t> out of 22 occupation types in the US </a:t>
+            </a:r>
+          </a:p>
+          <a:p>
             <a:r>
               <a:rPr lang="en-US" sz="2400" dirty="0"/>
-              <a:t>YOY growth for 2017 vs 2016 </a:t>
-            </a:r>
-            <a:r>
-              <a:rPr lang="en-US" sz="2400" dirty="0" smtClean="0"/>
-              <a:t>: </a:t>
-            </a:r>
-            <a:r>
-              <a:rPr lang="en-US" sz="2400" b="1" dirty="0"/>
-              <a:t>Computer </a:t>
-            </a:r>
-            <a:r>
-              <a:rPr lang="en-US" sz="2400" b="1" dirty="0" smtClean="0"/>
-              <a:t>Programmers</a:t>
-            </a:r>
-          </a:p>
-          <a:p>
-            <a:r>
-              <a:rPr lang="en-US" sz="2400" dirty="0" smtClean="0"/>
-              <a:t>Computer and Mathematical Occupations is </a:t>
-            </a:r>
-            <a:r>
-              <a:rPr lang="en-US" sz="2400" b="1" dirty="0" smtClean="0"/>
-              <a:t>14</a:t>
-            </a:r>
-            <a:r>
-              <a:rPr lang="en-US" sz="2400" b="1" baseline="30000" dirty="0" smtClean="0"/>
-              <a:t>th</a:t>
-            </a:r>
-            <a:r>
-              <a:rPr lang="en-US" sz="2400" dirty="0" smtClean="0"/>
-              <a:t> out of 22 occupation types </a:t>
-            </a:r>
-            <a:r>
-              <a:rPr lang="en-US" sz="2400" dirty="0"/>
-              <a:t>in </a:t>
-            </a:r>
-            <a:r>
-              <a:rPr lang="en-US" sz="2400" dirty="0" smtClean="0"/>
-              <a:t>the US </a:t>
-            </a:r>
-          </a:p>
-          <a:p>
-            <a:r>
-              <a:rPr lang="en-US" sz="2400" dirty="0" smtClean="0"/>
-              <a:t>Within </a:t>
-            </a:r>
-            <a:r>
-              <a:rPr lang="en-US" sz="2400" dirty="0"/>
-              <a:t>Computer and Mathematical </a:t>
-            </a:r>
-            <a:r>
-              <a:rPr lang="en-US" sz="2400" dirty="0" smtClean="0"/>
-              <a:t>Occupations, </a:t>
+              <a:t>Within Computer and Mathematical Occupations, </a:t>
             </a:r>
             <a:r>
               <a:rPr lang="en-US" sz="2400" b="1" dirty="0">
@@ -6469,47 +6390,21 @@
                   </a:schemeClr>
                 </a:solidFill>
               </a:rPr>
-              <a:t>Software Developers (</a:t>
-            </a:r>
-            <a:r>
-              <a:rPr lang="en-US" sz="2400" b="1" dirty="0" smtClean="0">
-                <a:solidFill>
-                  <a:schemeClr val="tx1">
-                    <a:lumMod val="95000"/>
-                  </a:schemeClr>
-                </a:solidFill>
-              </a:rPr>
-              <a:t>Applications) </a:t>
-            </a:r>
-            <a:r>
-              <a:rPr lang="en-US" sz="2400" dirty="0" smtClean="0"/>
-              <a:t>had </a:t>
+              <a:t>Software Developers (Applications) </a:t>
             </a:r>
             <a:r>
               <a:rPr lang="en-US" sz="2400" dirty="0"/>
-              <a:t>the highest number of employees in </a:t>
-            </a:r>
-            <a:r>
-              <a:rPr lang="en-US" sz="2400" dirty="0" smtClean="0"/>
-              <a:t>2017</a:t>
-            </a:r>
-          </a:p>
-          <a:p>
-            <a:r>
-              <a:rPr lang="en-US" sz="2400" b="1" dirty="0" smtClean="0"/>
+              <a:t>had the highest number of employees in 2017</a:t>
+            </a:r>
+          </a:p>
+          <a:p>
+            <a:r>
+              <a:rPr lang="en-US" sz="2400" b="1" dirty="0"/>
               <a:t>California</a:t>
             </a:r>
             <a:r>
-              <a:rPr lang="en-US" sz="2400" dirty="0" smtClean="0"/>
-              <a:t> had </a:t>
-            </a:r>
-            <a:r>
               <a:rPr lang="en-US" sz="2400" dirty="0"/>
-              <a:t>the most people working in computer and mathematical related occupations in </a:t>
-            </a:r>
-            <a:r>
-              <a:rPr lang="en-US" sz="2400" dirty="0" smtClean="0"/>
-              <a:t>2017</a:t>
+              <a:t> had the most people working in computer and mathematical related occupations in 2017</a:t>
             </a:r>
             <a:endParaRPr lang="en-US" sz="2400" b="1" dirty="0">
               <a:latin typeface="Calibri" panose="020F0502020204030204" pitchFamily="34" charset="0"/>
@@ -6522,10 +6417,10 @@
             <a:endParaRPr lang="en-US" sz="2400" b="1" dirty="0"/>
           </a:p>
           <a:p>
-            <a:endParaRPr lang="en-US" sz="2800" dirty="0" smtClean="0"/>
-          </a:p>
-          <a:p>
-            <a:endParaRPr lang="en-US" sz="2800" dirty="0" smtClean="0"/>
+            <a:endParaRPr lang="en-US" sz="2800" dirty="0"/>
+          </a:p>
+          <a:p>
+            <a:endParaRPr lang="en-US" sz="2800" dirty="0"/>
           </a:p>
           <a:p>
             <a:endParaRPr lang="en-US" dirty="0"/>
@@ -6567,7 +6462,7 @@
           <p:cNvPr id="2" name="Title 1">
             <a:extLst>
               <a:ext uri="{FF2B5EF4-FFF2-40B4-BE49-F238E27FC236}">
-                <a16:creationId xmlns="" xmlns:a16="http://schemas.microsoft.com/office/drawing/2014/main" id="{D8975F0A-4727-47D2-96A8-DFAC0FBD6C91}"/>
+                <a16:creationId xmlns:a16="http://schemas.microsoft.com/office/drawing/2014/main" id="{D8975F0A-4727-47D2-96A8-DFAC0FBD6C91}"/>
               </a:ext>
             </a:extLst>
           </p:cNvPr>
@@ -6595,7 +6490,7 @@
           <p:cNvPr id="3" name="Content Placeholder 2">
             <a:extLst>
               <a:ext uri="{FF2B5EF4-FFF2-40B4-BE49-F238E27FC236}">
-                <a16:creationId xmlns="" xmlns:a16="http://schemas.microsoft.com/office/drawing/2014/main" id="{C69386F3-A2F7-4C59-B5D1-F22F1E51F196}"/>
+                <a16:creationId xmlns:a16="http://schemas.microsoft.com/office/drawing/2014/main" id="{C69386F3-A2F7-4C59-B5D1-F22F1E51F196}"/>
               </a:ext>
             </a:extLst>
           </p:cNvPr>
@@ -6679,7 +6574,7 @@
           <p:cNvPr id="2" name="Title 1">
             <a:extLst>
               <a:ext uri="{FF2B5EF4-FFF2-40B4-BE49-F238E27FC236}">
-                <a16:creationId xmlns="" xmlns:a16="http://schemas.microsoft.com/office/drawing/2014/main" id="{E1C9EF35-DC7C-428F-A8C6-930DEFB1E1DB}"/>
+                <a16:creationId xmlns:a16="http://schemas.microsoft.com/office/drawing/2014/main" id="{E1C9EF35-DC7C-428F-A8C6-930DEFB1E1DB}"/>
               </a:ext>
             </a:extLst>
           </p:cNvPr>
@@ -6707,7 +6602,7 @@
           <p:cNvPr id="3" name="Content Placeholder 2">
             <a:extLst>
               <a:ext uri="{FF2B5EF4-FFF2-40B4-BE49-F238E27FC236}">
-                <a16:creationId xmlns="" xmlns:a16="http://schemas.microsoft.com/office/drawing/2014/main" id="{1B82C285-6A5A-45FC-B1D5-1D0786CBCFB5}"/>
+                <a16:creationId xmlns:a16="http://schemas.microsoft.com/office/drawing/2014/main" id="{1B82C285-6A5A-45FC-B1D5-1D0786CBCFB5}"/>
               </a:ext>
             </a:extLst>
           </p:cNvPr>
@@ -6786,7 +6681,7 @@
           <p:cNvPr id="2" name="Title 1">
             <a:extLst>
               <a:ext uri="{FF2B5EF4-FFF2-40B4-BE49-F238E27FC236}">
-                <a16:creationId xmlns="" xmlns:a16="http://schemas.microsoft.com/office/drawing/2014/main" id="{55A6334A-68E7-42D4-919A-0C62BE53DBB2}"/>
+                <a16:creationId xmlns:a16="http://schemas.microsoft.com/office/drawing/2014/main" id="{55A6334A-68E7-42D4-919A-0C62BE53DBB2}"/>
               </a:ext>
             </a:extLst>
           </p:cNvPr>
@@ -6812,15 +6707,7 @@
             <a:pPr algn="ctr"/>
             <a:r>
               <a:rPr lang="en-US" sz="6700" dirty="0"/>
-              <a:t>Thank </a:t>
-            </a:r>
-            <a:r>
-              <a:rPr lang="en-US" sz="6700" dirty="0" smtClean="0"/>
-              <a:t>you!</a:t>
-            </a:r>
-            <a:r>
-              <a:rPr lang="en-US" dirty="0"/>
-              <a:t/>
+              <a:t>Thank you!</a:t>
             </a:r>
             <a:br>
               <a:rPr lang="en-US" dirty="0"/>
@@ -6834,7 +6721,7 @@
           <p:cNvPr id="3" name="Content Placeholder 2">
             <a:extLst>
               <a:ext uri="{FF2B5EF4-FFF2-40B4-BE49-F238E27FC236}">
-                <a16:creationId xmlns="" xmlns:a16="http://schemas.microsoft.com/office/drawing/2014/main" id="{1C25BB28-A4EC-414D-859C-C7A0FCD1F980}"/>
+                <a16:creationId xmlns:a16="http://schemas.microsoft.com/office/drawing/2014/main" id="{1C25BB28-A4EC-414D-859C-C7A0FCD1F980}"/>
               </a:ext>
             </a:extLst>
           </p:cNvPr>
@@ -6861,12 +6748,8 @@
               <a:buNone/>
             </a:pPr>
             <a:r>
-              <a:rPr lang="en-US" sz="4800" dirty="0" smtClean="0"/>
-              <a:t>Questions</a:t>
-            </a:r>
-            <a:r>
               <a:rPr lang="en-US" sz="4800" dirty="0"/>
-              <a:t>?</a:t>
+              <a:t>Questions?</a:t>
             </a:r>
           </a:p>
         </p:txBody>
@@ -6906,7 +6789,7 @@
           <p:cNvPr id="2" name="Title 1">
             <a:extLst>
               <a:ext uri="{FF2B5EF4-FFF2-40B4-BE49-F238E27FC236}">
-                <a16:creationId xmlns="" xmlns:a16="http://schemas.microsoft.com/office/drawing/2014/main" id="{41B5C587-4962-4E00-A54B-F8B9FE251918}"/>
+                <a16:creationId xmlns:a16="http://schemas.microsoft.com/office/drawing/2014/main" id="{41B5C587-4962-4E00-A54B-F8B9FE251918}"/>
               </a:ext>
             </a:extLst>
           </p:cNvPr>
@@ -6934,7 +6817,7 @@
           <p:cNvPr id="3" name="Content Placeholder 2">
             <a:extLst>
               <a:ext uri="{FF2B5EF4-FFF2-40B4-BE49-F238E27FC236}">
-                <a16:creationId xmlns="" xmlns:a16="http://schemas.microsoft.com/office/drawing/2014/main" id="{129B7FB5-54B8-4545-A8C7-1D4B4C033F1E}"/>
+                <a16:creationId xmlns:a16="http://schemas.microsoft.com/office/drawing/2014/main" id="{129B7FB5-54B8-4545-A8C7-1D4B4C033F1E}"/>
               </a:ext>
             </a:extLst>
           </p:cNvPr>
@@ -6962,13 +6845,8 @@
             </a:pPr>
             <a:r>
               <a:rPr lang="en-US" sz="2400" dirty="0"/>
-              <a:t>The purpose of this project is to analyze US employment data to observe trends in computer and mathematical occupations based on location and job </a:t>
-            </a:r>
-            <a:r>
-              <a:rPr lang="en-US" sz="2400" dirty="0" smtClean="0"/>
-              <a:t>title </a:t>
-            </a:r>
-            <a:endParaRPr lang="en-US" sz="2400" dirty="0"/>
+              <a:t>The purpose of this project is to analyze US employment data to observe trends in computer and mathematical occupations based on location and job title </a:t>
+            </a:r>
           </a:p>
           <a:p>
             <a:endParaRPr lang="en-US" dirty="0"/>
@@ -7073,7 +6951,7 @@
           <p:cNvPr id="2" name="Title 1">
             <a:extLst>
               <a:ext uri="{FF2B5EF4-FFF2-40B4-BE49-F238E27FC236}">
-                <a16:creationId xmlns="" xmlns:a16="http://schemas.microsoft.com/office/drawing/2014/main" id="{B01FBC95-86CC-4C5D-80F0-CF41A33B1E9F}"/>
+                <a16:creationId xmlns:a16="http://schemas.microsoft.com/office/drawing/2014/main" id="{B01FBC95-86CC-4C5D-80F0-CF41A33B1E9F}"/>
               </a:ext>
             </a:extLst>
           </p:cNvPr>
@@ -7101,7 +6979,7 @@
           <p:cNvPr id="3" name="Content Placeholder 2">
             <a:extLst>
               <a:ext uri="{FF2B5EF4-FFF2-40B4-BE49-F238E27FC236}">
-                <a16:creationId xmlns="" xmlns:a16="http://schemas.microsoft.com/office/drawing/2014/main" id="{CACC8578-D28C-470E-8EBE-3E9A3C6434E3}"/>
+                <a16:creationId xmlns:a16="http://schemas.microsoft.com/office/drawing/2014/main" id="{CACC8578-D28C-470E-8EBE-3E9A3C6434E3}"/>
               </a:ext>
             </a:extLst>
           </p:cNvPr>
@@ -7139,7 +7017,7 @@
                 <a:hlinkClick r:id="rId2">
                   <a:extLst>
                     <a:ext uri="{A12FA001-AC4F-418D-AE19-62706E023703}">
-                      <ahyp:hlinkClr xmlns="" xmlns:ahyp="http://schemas.microsoft.com/office/drawing/2018/hyperlinkcolor" val="tx"/>
+                      <ahyp:hlinkClr xmlns:ahyp="http://schemas.microsoft.com/office/drawing/2018/hyperlinkcolor" val="tx"/>
                     </a:ext>
                   </a:extLst>
                 </a:hlinkClick>
@@ -7182,7 +7060,7 @@
                 <a:hlinkClick r:id="rId3">
                   <a:extLst>
                     <a:ext uri="{A12FA001-AC4F-418D-AE19-62706E023703}">
-                      <ahyp:hlinkClr xmlns="" xmlns:ahyp="http://schemas.microsoft.com/office/drawing/2018/hyperlinkcolor" val="tx"/>
+                      <ahyp:hlinkClr xmlns:ahyp="http://schemas.microsoft.com/office/drawing/2018/hyperlinkcolor" val="tx"/>
                     </a:ext>
                   </a:extLst>
                 </a:hlinkClick>
@@ -7201,15 +7079,7 @@
             </a:r>
             <a:r>
               <a:rPr lang="en-US" dirty="0"/>
-              <a:t>Used for state population estimates (as of </a:t>
-            </a:r>
-            <a:r>
-              <a:rPr lang="en-US" dirty="0" smtClean="0"/>
-              <a:t>7/1</a:t>
-            </a:r>
-            <a:r>
-              <a:rPr lang="en-US" dirty="0"/>
-              <a:t>) from 2013 through 2017</a:t>
+              <a:t>Used for state population estimates (as of 7/1) from 2013 through 2017</a:t>
             </a:r>
           </a:p>
           <a:p>
@@ -7223,7 +7093,7 @@
           <p:cNvPr id="4" name="Picture 3">
             <a:extLst>
               <a:ext uri="{FF2B5EF4-FFF2-40B4-BE49-F238E27FC236}">
-                <a16:creationId xmlns="" xmlns:a16="http://schemas.microsoft.com/office/drawing/2014/main" id="{E7D53E29-B383-4B9D-A554-11B128DFEE9B}"/>
+                <a16:creationId xmlns:a16="http://schemas.microsoft.com/office/drawing/2014/main" id="{E7D53E29-B383-4B9D-A554-11B128DFEE9B}"/>
               </a:ext>
             </a:extLst>
           </p:cNvPr>
@@ -7253,7 +7123,7 @@
           <p:cNvPr id="6" name="Picture 5">
             <a:extLst>
               <a:ext uri="{FF2B5EF4-FFF2-40B4-BE49-F238E27FC236}">
-                <a16:creationId xmlns="" xmlns:a16="http://schemas.microsoft.com/office/drawing/2014/main" id="{064340ED-E940-4A96-89BA-D2EE55992785}"/>
+                <a16:creationId xmlns:a16="http://schemas.microsoft.com/office/drawing/2014/main" id="{064340ED-E940-4A96-89BA-D2EE55992785}"/>
               </a:ext>
             </a:extLst>
           </p:cNvPr>
@@ -7319,7 +7189,7 @@
           <p:cNvPr id="3" name="Content Placeholder 2">
             <a:extLst>
               <a:ext uri="{FF2B5EF4-FFF2-40B4-BE49-F238E27FC236}">
-                <a16:creationId xmlns:a16="http://schemas.microsoft.com/office/drawing/2014/main" xmlns="" id="{75897B1C-3F8F-4B5D-8723-E5115AF5882A}"/>
+                <a16:creationId xmlns:a16="http://schemas.microsoft.com/office/drawing/2014/main" id="{75897B1C-3F8F-4B5D-8723-E5115AF5882A}"/>
               </a:ext>
             </a:extLst>
           </p:cNvPr>
@@ -7347,63 +7217,26 @@
             </a:pPr>
             <a:r>
               <a:rPr lang="en-US" sz="2500" dirty="0"/>
-              <a:t>S</a:t>
-            </a:r>
-            <a:r>
-              <a:rPr lang="en-US" sz="2500" dirty="0" smtClean="0"/>
-              <a:t>tates chosen based on fastest YOY </a:t>
-            </a:r>
-            <a:r>
-              <a:rPr lang="en-US" sz="2500" dirty="0"/>
-              <a:t>growth </a:t>
-            </a:r>
-            <a:r>
-              <a:rPr lang="en-US" sz="2500" dirty="0" smtClean="0"/>
-              <a:t>for 2017 vs 2016.  Included US as a comparison point</a:t>
+              <a:t>States chosen based on fastest YOY growth for 2017 vs 2016.  Included US as a comparison point</a:t>
             </a:r>
             <a:endParaRPr lang="en-US" sz="100" dirty="0"/>
           </a:p>
           <a:p>
             <a:r>
               <a:rPr lang="en-US" dirty="0"/>
-              <a:t>O</a:t>
-            </a:r>
-            <a:r>
-              <a:rPr lang="en-US" dirty="0" smtClean="0"/>
-              <a:t>verall US grew in 2017, but not as fast as it did in 2016 and 2015</a:t>
-            </a:r>
-          </a:p>
-          <a:p>
-            <a:r>
-              <a:rPr lang="en-US" dirty="0" smtClean="0"/>
-              <a:t>Top 3 fastest states/territories are Guam, Montana, and </a:t>
-            </a:r>
-            <a:r>
-              <a:rPr lang="en-US" dirty="0" smtClean="0"/>
-              <a:t>Utah.  Both </a:t>
-            </a:r>
-            <a:r>
-              <a:rPr lang="en-US" dirty="0" smtClean="0"/>
-              <a:t>Guam and Montana show a volatile job </a:t>
-            </a:r>
-            <a:r>
-              <a:rPr lang="en-US" dirty="0" smtClean="0"/>
-              <a:t>market from 2014-2017</a:t>
-            </a:r>
-            <a:endParaRPr lang="en-US" dirty="0" smtClean="0"/>
-          </a:p>
-          <a:p>
-            <a:r>
-              <a:rPr lang="en-US" dirty="0" smtClean="0"/>
-              <a:t>Utah also did not grow as much as it did in 2016, </a:t>
-            </a:r>
-            <a:r>
-              <a:rPr lang="en-US" dirty="0" smtClean="0"/>
-              <a:t>like the overall US, but </a:t>
-            </a:r>
-            <a:r>
-              <a:rPr lang="en-US" dirty="0" smtClean="0"/>
-              <a:t>continued to experience a strong job market</a:t>
+              <a:t>Overall US grew in 2017, but not as fast as it did in 2016 and 2015</a:t>
+            </a:r>
+          </a:p>
+          <a:p>
+            <a:r>
+              <a:rPr lang="en-US" dirty="0"/>
+              <a:t>Top 3 fastest states/territories are Guam, Montana, and Utah.  Both Guam and Montana show a volatile job market from 2014-2017</a:t>
+            </a:r>
+          </a:p>
+          <a:p>
+            <a:r>
+              <a:rPr lang="en-US" dirty="0"/>
+              <a:t>Utah also did not grow as much as it did in 2016, like the overall US, but continued to experience a strong job market</a:t>
             </a:r>
           </a:p>
           <a:p>
@@ -7443,7 +7276,7 @@
           <p:cNvPr id="5" name="Picture 12">
             <a:extLst>
               <a:ext uri="{FF2B5EF4-FFF2-40B4-BE49-F238E27FC236}">
-                <a16:creationId xmlns="" xmlns:a16="http://schemas.microsoft.com/office/drawing/2014/main" id="{6F0AC7CD-13B1-49CA-A210-0FEA7F648B7C}"/>
+                <a16:creationId xmlns:a16="http://schemas.microsoft.com/office/drawing/2014/main" id="{6F0AC7CD-13B1-49CA-A210-0FEA7F648B7C}"/>
               </a:ext>
             </a:extLst>
           </p:cNvPr>
@@ -7527,25 +7360,8 @@
                   </a:schemeClr>
                 </a:solidFill>
               </a:rPr>
-              <a:t>Computer and Mathematical Occupations, Computer and Information Research Scientists, Computer Systems Analysts, Information Security Analysts, Computer Programmers, Software Developers (Applications), Software Developers (Systems Software), Web Developers, Database Administrators, Network and Computer Systems Administrators, Computer Network Architects, Computer User Support Specialists, Computer Network Support Specialists, Computer Occupations - All Other, Actuaries, Mathematicians, Operations Research Analysts, &amp; </a:t>
-            </a:r>
-            <a:r>
-              <a:rPr lang="en-US" sz="1000" dirty="0" smtClean="0">
-                <a:solidFill>
-                  <a:schemeClr val="tx1">
-                    <a:lumMod val="95000"/>
-                  </a:schemeClr>
-                </a:solidFill>
-              </a:rPr>
-              <a:t>Statisticians</a:t>
-            </a:r>
-            <a:endParaRPr lang="en-US" sz="1000" dirty="0">
-              <a:solidFill>
-                <a:schemeClr val="tx1">
-                  <a:lumMod val="95000"/>
-                </a:schemeClr>
-              </a:solidFill>
-            </a:endParaRPr>
+              <a:t>Computer and Mathematical Occupations, Computer and Information Research Scientists, Computer Systems Analysts, Information Security Analysts, Computer Programmers, Software Developers (Applications), Software Developers (Systems Software), Web Developers, Database Administrators, Network and Computer Systems Administrators, Computer Network Architects, Computer User Support Specialists, Computer Network Support Specialists, Computer Occupations - All Other, Actuaries, Mathematicians, Operations Research Analysts, &amp; Statisticians</a:t>
+            </a:r>
           </a:p>
         </p:txBody>
       </p:sp>
@@ -7584,7 +7400,7 @@
           <p:cNvPr id="5" name="Content Placeholder 2">
             <a:extLst>
               <a:ext uri="{FF2B5EF4-FFF2-40B4-BE49-F238E27FC236}">
-                <a16:creationId xmlns:a16="http://schemas.microsoft.com/office/drawing/2014/main" xmlns="" id="{75897B1C-3F8F-4B5D-8723-E5115AF5882A}"/>
+                <a16:creationId xmlns:a16="http://schemas.microsoft.com/office/drawing/2014/main" id="{75897B1C-3F8F-4B5D-8723-E5115AF5882A}"/>
               </a:ext>
             </a:extLst>
           </p:cNvPr>
@@ -7776,46 +7592,22 @@
               <a:buNone/>
             </a:pPr>
             <a:r>
-              <a:rPr lang="en-US" sz="2700" dirty="0" smtClean="0"/>
+              <a:rPr lang="en-US" sz="2700" dirty="0"/>
               <a:t>Bottom three states chosen based on slowest YOY growth for 2017 vs 2016.  Included US as a comparison point</a:t>
             </a:r>
           </a:p>
           <a:p>
             <a:r>
-              <a:rPr lang="en-US" sz="2400" dirty="0" smtClean="0"/>
-              <a:t>The three </a:t>
-            </a:r>
-            <a:r>
-              <a:rPr lang="en-US" sz="2400" dirty="0" smtClean="0"/>
-              <a:t>bottom states are Louisiana, New Mexico, </a:t>
-            </a:r>
-            <a:r>
               <a:rPr lang="en-US" sz="2400" dirty="0"/>
-              <a:t>and </a:t>
-            </a:r>
-            <a:r>
-              <a:rPr lang="en-US" sz="2400" dirty="0" smtClean="0"/>
-              <a:t>Minnesota.  All three of these states experienced growth in 2016.  Out of the three, New Mexico experienced the largest % decline</a:t>
-            </a:r>
-          </a:p>
-          <a:p>
-            <a:r>
-              <a:rPr lang="en-US" sz="2400" dirty="0" smtClean="0"/>
-              <a:t>All three of these state outgrew </a:t>
-            </a:r>
-            <a:r>
-              <a:rPr lang="en-US" sz="2400" dirty="0" smtClean="0"/>
-              <a:t>total</a:t>
-            </a:r>
-            <a:r>
-              <a:rPr lang="en-US" sz="2400" dirty="0" smtClean="0"/>
-              <a:t> </a:t>
-            </a:r>
-            <a:r>
-              <a:rPr lang="en-US" sz="2400" dirty="0" smtClean="0"/>
-              <a:t>US in 2014, but did not exceed overall US growth in 2015, 2016, or 2017</a:t>
-            </a:r>
-            <a:endParaRPr lang="en-US" dirty="0" smtClean="0"/>
+              <a:t>The three bottom states are Louisiana, New Mexico, and Minnesota.  All three of these states experienced growth in 2016.  Out of the three, New Mexico experienced the largest % decline</a:t>
+            </a:r>
+          </a:p>
+          <a:p>
+            <a:r>
+              <a:rPr lang="en-US" sz="2400" dirty="0"/>
+              <a:t>All three of these state outgrew total US in 2014, but did not exceed overall US growth in 2015, 2016, or 2017</a:t>
+            </a:r>
+            <a:endParaRPr lang="en-US" dirty="0"/>
           </a:p>
           <a:p>
             <a:endParaRPr lang="en-US" dirty="0"/>
@@ -7851,7 +7643,7 @@
           <p:cNvPr id="6" name="Picture 10">
             <a:extLst>
               <a:ext uri="{FF2B5EF4-FFF2-40B4-BE49-F238E27FC236}">
-                <a16:creationId xmlns="" xmlns:a16="http://schemas.microsoft.com/office/drawing/2014/main" id="{C7E7A439-E819-4DB7-B4F7-A25B98A49CCC}"/>
+                <a16:creationId xmlns:a16="http://schemas.microsoft.com/office/drawing/2014/main" id="{C7E7A439-E819-4DB7-B4F7-A25B98A49CCC}"/>
               </a:ext>
             </a:extLst>
           </p:cNvPr>
@@ -7935,25 +7727,8 @@
                   </a:schemeClr>
                 </a:solidFill>
               </a:rPr>
-              <a:t>Computer and Mathematical Occupations, Computer and Information Research Scientists, Computer Systems Analysts, Information Security Analysts, Computer Programmers, Software Developers (Applications), Software Developers (Systems Software), Web Developers, Database Administrators, Network and Computer Systems Administrators, Computer Network Architects, Computer User Support Specialists, Computer Network Support Specialists, Computer Occupations - All Other, Actuaries, Mathematicians, Operations Research Analysts, &amp; </a:t>
-            </a:r>
-            <a:r>
-              <a:rPr lang="en-US" sz="1000" dirty="0" smtClean="0">
-                <a:solidFill>
-                  <a:schemeClr val="tx1">
-                    <a:lumMod val="95000"/>
-                  </a:schemeClr>
-                </a:solidFill>
-              </a:rPr>
-              <a:t>Statisticians</a:t>
-            </a:r>
-            <a:endParaRPr lang="en-US" sz="1000" dirty="0">
-              <a:solidFill>
-                <a:schemeClr val="tx1">
-                  <a:lumMod val="95000"/>
-                </a:schemeClr>
-              </a:solidFill>
-            </a:endParaRPr>
+              <a:t>Computer and Mathematical Occupations, Computer and Information Research Scientists, Computer Systems Analysts, Information Security Analysts, Computer Programmers, Software Developers (Applications), Software Developers (Systems Software), Web Developers, Database Administrators, Network and Computer Systems Administrators, Computer Network Architects, Computer User Support Specialists, Computer Network Support Specialists, Computer Occupations - All Other, Actuaries, Mathematicians, Operations Research Analysts, &amp; Statisticians</a:t>
+            </a:r>
           </a:p>
         </p:txBody>
       </p:sp>
@@ -7992,7 +7767,7 @@
           <p:cNvPr id="3" name="Content Placeholder 2">
             <a:extLst>
               <a:ext uri="{FF2B5EF4-FFF2-40B4-BE49-F238E27FC236}">
-                <a16:creationId xmlns="" xmlns:a16="http://schemas.microsoft.com/office/drawing/2014/main" id="{A1BF3F66-EBAC-4059-95DC-84F0A2D0D9F8}"/>
+                <a16:creationId xmlns:a16="http://schemas.microsoft.com/office/drawing/2014/main" id="{A1BF3F66-EBAC-4059-95DC-84F0A2D0D9F8}"/>
               </a:ext>
             </a:extLst>
           </p:cNvPr>
@@ -8024,20 +7799,15 @@
             <a:pPr lvl="1"/>
             <a:r>
               <a:rPr lang="en-US" dirty="0"/>
-              <a:t>Surprisingly, a larger population did not necessarily translate to higher job growth in this </a:t>
-            </a:r>
-            <a:r>
-              <a:rPr lang="en-US" dirty="0" smtClean="0"/>
-              <a:t>case</a:t>
+              <a:t>Surprisingly, a larger population did not necessarily translate to higher job growth in this case</a:t>
             </a:r>
           </a:p>
           <a:p>
             <a:pPr lvl="1"/>
             <a:r>
-              <a:rPr lang="en-US" dirty="0" smtClean="0"/>
+              <a:rPr lang="en-US" dirty="0"/>
               <a:t>Highest growth rates seen for states with less than 5MM people</a:t>
             </a:r>
-            <a:endParaRPr lang="en-US" dirty="0" smtClean="0"/>
           </a:p>
         </p:txBody>
       </p:sp>
@@ -8046,7 +7816,7 @@
           <p:cNvPr id="1028" name="Picture 4">
             <a:extLst>
               <a:ext uri="{FF2B5EF4-FFF2-40B4-BE49-F238E27FC236}">
-                <a16:creationId xmlns="" xmlns:a16="http://schemas.microsoft.com/office/drawing/2014/main" id="{642F8360-CC0D-4DD9-9C82-369B6108FA21}"/>
+                <a16:creationId xmlns:a16="http://schemas.microsoft.com/office/drawing/2014/main" id="{642F8360-CC0D-4DD9-9C82-369B6108FA21}"/>
               </a:ext>
             </a:extLst>
           </p:cNvPr>
@@ -8171,7 +7941,7 @@
           <p:cNvPr id="2" name="Title 1">
             <a:extLst>
               <a:ext uri="{FF2B5EF4-FFF2-40B4-BE49-F238E27FC236}">
-                <a16:creationId xmlns="" xmlns:a16="http://schemas.microsoft.com/office/drawing/2014/main" id="{AB68570A-62BD-4471-B097-C694410375A6}"/>
+                <a16:creationId xmlns:a16="http://schemas.microsoft.com/office/drawing/2014/main" id="{AB68570A-62BD-4471-B097-C694410375A6}"/>
               </a:ext>
             </a:extLst>
           </p:cNvPr>
@@ -8199,7 +7969,7 @@
           <p:cNvPr id="5" name="Content Placeholder 4">
             <a:extLst>
               <a:ext uri="{FF2B5EF4-FFF2-40B4-BE49-F238E27FC236}">
-                <a16:creationId xmlns="" xmlns:a16="http://schemas.microsoft.com/office/drawing/2014/main" id="{EEB80261-BFDA-43BA-9A2B-7566F24FD572}"/>
+                <a16:creationId xmlns:a16="http://schemas.microsoft.com/office/drawing/2014/main" id="{EEB80261-BFDA-43BA-9A2B-7566F24FD572}"/>
               </a:ext>
             </a:extLst>
           </p:cNvPr>
@@ -8234,7 +8004,7 @@
           <p:cNvPr id="7" name="Picture 6">
             <a:extLst>
               <a:ext uri="{FF2B5EF4-FFF2-40B4-BE49-F238E27FC236}">
-                <a16:creationId xmlns="" xmlns:a16="http://schemas.microsoft.com/office/drawing/2014/main" id="{AD43CADE-D702-44C9-9494-04A14FD16E34}"/>
+                <a16:creationId xmlns:a16="http://schemas.microsoft.com/office/drawing/2014/main" id="{AD43CADE-D702-44C9-9494-04A14FD16E34}"/>
               </a:ext>
             </a:extLst>
           </p:cNvPr>
@@ -8300,7 +8070,7 @@
           <p:cNvPr id="2" name="Title 1">
             <a:extLst>
               <a:ext uri="{FF2B5EF4-FFF2-40B4-BE49-F238E27FC236}">
-                <a16:creationId xmlns="" xmlns:a16="http://schemas.microsoft.com/office/drawing/2014/main" id="{A596BA33-7754-4852-A943-2BF56BC5ACEE}"/>
+                <a16:creationId xmlns:a16="http://schemas.microsoft.com/office/drawing/2014/main" id="{A596BA33-7754-4852-A943-2BF56BC5ACEE}"/>
               </a:ext>
             </a:extLst>
           </p:cNvPr>
@@ -8333,7 +8103,7 @@
           <p:cNvPr id="4" name="Content Placeholder 3">
             <a:extLst>
               <a:ext uri="{FF2B5EF4-FFF2-40B4-BE49-F238E27FC236}">
-                <a16:creationId xmlns="" xmlns:a16="http://schemas.microsoft.com/office/drawing/2014/main" id="{491C927E-30F3-4185-BE20-0B6D3C5A74A6}"/>
+                <a16:creationId xmlns:a16="http://schemas.microsoft.com/office/drawing/2014/main" id="{491C927E-30F3-4185-BE20-0B6D3C5A74A6}"/>
               </a:ext>
             </a:extLst>
           </p:cNvPr>
@@ -8363,21 +8133,21 @@
                 <a:gridCol w="1647559">
                   <a:extLst>
                     <a:ext uri="{9D8B030D-6E8A-4147-A177-3AD203B41FA5}">
-                      <a16:colId xmlns="" xmlns:a16="http://schemas.microsoft.com/office/drawing/2014/main" val="957085690"/>
+                      <a16:colId xmlns:a16="http://schemas.microsoft.com/office/drawing/2014/main" val="957085690"/>
                     </a:ext>
                   </a:extLst>
                 </a:gridCol>
                 <a:gridCol w="1647559">
                   <a:extLst>
                     <a:ext uri="{9D8B030D-6E8A-4147-A177-3AD203B41FA5}">
-                      <a16:colId xmlns="" xmlns:a16="http://schemas.microsoft.com/office/drawing/2014/main" val="3984160696"/>
+                      <a16:colId xmlns:a16="http://schemas.microsoft.com/office/drawing/2014/main" val="3984160696"/>
                     </a:ext>
                   </a:extLst>
                 </a:gridCol>
                 <a:gridCol w="1924582">
                   <a:extLst>
                     <a:ext uri="{9D8B030D-6E8A-4147-A177-3AD203B41FA5}">
-                      <a16:colId xmlns="" xmlns:a16="http://schemas.microsoft.com/office/drawing/2014/main" val="3944266915"/>
+                      <a16:colId xmlns:a16="http://schemas.microsoft.com/office/drawing/2014/main" val="3944266915"/>
                     </a:ext>
                   </a:extLst>
                 </a:gridCol>
@@ -8475,7 +8245,7 @@
                 </a:tc>
                 <a:extLst>
                   <a:ext uri="{0D108BD9-81ED-4DB2-BD59-A6C34878D82A}">
-                    <a16:rowId xmlns="" xmlns:a16="http://schemas.microsoft.com/office/drawing/2014/main" val="3101018803"/>
+                    <a16:rowId xmlns:a16="http://schemas.microsoft.com/office/drawing/2014/main" val="3101018803"/>
                   </a:ext>
                 </a:extLst>
               </a:tr>
@@ -8560,7 +8330,7 @@
                 </a:tc>
                 <a:extLst>
                   <a:ext uri="{0D108BD9-81ED-4DB2-BD59-A6C34878D82A}">
-                    <a16:rowId xmlns="" xmlns:a16="http://schemas.microsoft.com/office/drawing/2014/main" val="3649961185"/>
+                    <a16:rowId xmlns:a16="http://schemas.microsoft.com/office/drawing/2014/main" val="3649961185"/>
                   </a:ext>
                 </a:extLst>
               </a:tr>
@@ -8645,7 +8415,7 @@
                 </a:tc>
                 <a:extLst>
                   <a:ext uri="{0D108BD9-81ED-4DB2-BD59-A6C34878D82A}">
-                    <a16:rowId xmlns="" xmlns:a16="http://schemas.microsoft.com/office/drawing/2014/main" val="3566758617"/>
+                    <a16:rowId xmlns:a16="http://schemas.microsoft.com/office/drawing/2014/main" val="3566758617"/>
                   </a:ext>
                 </a:extLst>
               </a:tr>
@@ -8730,7 +8500,7 @@
                 </a:tc>
                 <a:extLst>
                   <a:ext uri="{0D108BD9-81ED-4DB2-BD59-A6C34878D82A}">
-                    <a16:rowId xmlns="" xmlns:a16="http://schemas.microsoft.com/office/drawing/2014/main" val="2431465096"/>
+                    <a16:rowId xmlns:a16="http://schemas.microsoft.com/office/drawing/2014/main" val="2431465096"/>
                   </a:ext>
                 </a:extLst>
               </a:tr>
@@ -8815,7 +8585,7 @@
                 </a:tc>
                 <a:extLst>
                   <a:ext uri="{0D108BD9-81ED-4DB2-BD59-A6C34878D82A}">
-                    <a16:rowId xmlns="" xmlns:a16="http://schemas.microsoft.com/office/drawing/2014/main" val="1755834529"/>
+                    <a16:rowId xmlns:a16="http://schemas.microsoft.com/office/drawing/2014/main" val="1755834529"/>
                   </a:ext>
                 </a:extLst>
               </a:tr>
@@ -8900,7 +8670,7 @@
                 </a:tc>
                 <a:extLst>
                   <a:ext uri="{0D108BD9-81ED-4DB2-BD59-A6C34878D82A}">
-                    <a16:rowId xmlns="" xmlns:a16="http://schemas.microsoft.com/office/drawing/2014/main" val="4151097572"/>
+                    <a16:rowId xmlns:a16="http://schemas.microsoft.com/office/drawing/2014/main" val="4151097572"/>
                   </a:ext>
                 </a:extLst>
               </a:tr>
@@ -8985,7 +8755,7 @@
                 </a:tc>
                 <a:extLst>
                   <a:ext uri="{0D108BD9-81ED-4DB2-BD59-A6C34878D82A}">
-                    <a16:rowId xmlns="" xmlns:a16="http://schemas.microsoft.com/office/drawing/2014/main" val="1023807493"/>
+                    <a16:rowId xmlns:a16="http://schemas.microsoft.com/office/drawing/2014/main" val="1023807493"/>
                   </a:ext>
                 </a:extLst>
               </a:tr>
@@ -9076,7 +8846,7 @@
                 </a:tc>
                 <a:extLst>
                   <a:ext uri="{0D108BD9-81ED-4DB2-BD59-A6C34878D82A}">
-                    <a16:rowId xmlns="" xmlns:a16="http://schemas.microsoft.com/office/drawing/2014/main" val="1166867636"/>
+                    <a16:rowId xmlns:a16="http://schemas.microsoft.com/office/drawing/2014/main" val="1166867636"/>
                   </a:ext>
                 </a:extLst>
               </a:tr>
@@ -9167,7 +8937,7 @@
                 </a:tc>
                 <a:extLst>
                   <a:ext uri="{0D108BD9-81ED-4DB2-BD59-A6C34878D82A}">
-                    <a16:rowId xmlns="" xmlns:a16="http://schemas.microsoft.com/office/drawing/2014/main" val="4172888325"/>
+                    <a16:rowId xmlns:a16="http://schemas.microsoft.com/office/drawing/2014/main" val="4172888325"/>
                   </a:ext>
                 </a:extLst>
               </a:tr>
@@ -9180,7 +8950,7 @@
           <p:cNvPr id="5" name="TextBox 4">
             <a:extLst>
               <a:ext uri="{FF2B5EF4-FFF2-40B4-BE49-F238E27FC236}">
-                <a16:creationId xmlns="" xmlns:a16="http://schemas.microsoft.com/office/drawing/2014/main" id="{4E286D4F-4DA4-47A6-B4A1-69C59C04C373}"/>
+                <a16:creationId xmlns:a16="http://schemas.microsoft.com/office/drawing/2014/main" id="{4E286D4F-4DA4-47A6-B4A1-69C59C04C373}"/>
               </a:ext>
             </a:extLst>
           </p:cNvPr>
@@ -9302,64 +9072,17 @@
           <a:chExt cx="0" cy="0"/>
         </a:xfrm>
       </p:grpSpPr>
-      <p:sp>
-        <p:nvSpPr>
-          <p:cNvPr id="2" name="Title 1">
+      <p:pic>
+        <p:nvPicPr>
+          <p:cNvPr id="5" name="Picture 4" descr="A screenshot of a cell phone&#10;&#10;Description automatically generated">
             <a:extLst>
               <a:ext uri="{FF2B5EF4-FFF2-40B4-BE49-F238E27FC236}">
-                <a16:creationId xmlns="" xmlns:a16="http://schemas.microsoft.com/office/drawing/2014/main" id="{1B85EE37-585C-E64B-A7B4-E9E8C734F5D4}"/>
-              </a:ext>
-            </a:extLst>
-          </p:cNvPr>
-          <p:cNvSpPr>
-            <a:spLocks noGrp="1"/>
-          </p:cNvSpPr>
-          <p:nvPr>
-            <p:ph type="title"/>
-          </p:nvPr>
-        </p:nvSpPr>
-        <p:spPr>
-          <a:xfrm>
-            <a:off x="192603" y="1195618"/>
-            <a:ext cx="3580327" cy="5394036"/>
-          </a:xfrm>
-        </p:spPr>
-        <p:txBody>
-          <a:bodyPr>
-            <a:normAutofit/>
-          </a:bodyPr>
-          <a:lstStyle/>
-          <a:p>
-            <a:r>
-              <a:rPr lang="en-US" sz="3400" dirty="0"/>
-              <a:t>The overall employment status by occupations in </a:t>
-            </a:r>
-            <a:r>
-              <a:rPr lang="en-US" sz="3400" dirty="0" smtClean="0"/>
-              <a:t>US: 2017</a:t>
-            </a:r>
-            <a:r>
-              <a:rPr lang="en-US" dirty="0"/>
-              <a:t/>
-            </a:r>
-            <a:br>
-              <a:rPr lang="en-US" dirty="0"/>
-            </a:br>
-            <a:endParaRPr lang="en-US" dirty="0"/>
-          </a:p>
-        </p:txBody>
-      </p:sp>
-      <p:pic>
-        <p:nvPicPr>
-          <p:cNvPr id="3074" name="Picture 2">
-            <a:extLst>
-              <a:ext uri="{FF2B5EF4-FFF2-40B4-BE49-F238E27FC236}">
-                <a16:creationId xmlns="" xmlns:a16="http://schemas.microsoft.com/office/drawing/2014/main" id="{F41EE0FD-2018-46CC-8500-10BF0C3A1649}"/>
+                <a16:creationId xmlns:a16="http://schemas.microsoft.com/office/drawing/2014/main" id="{5DF69AB2-A8CD-0444-9BE9-B09AE4043E5C}"/>
               </a:ext>
             </a:extLst>
           </p:cNvPr>
           <p:cNvPicPr>
-            <a:picLocks noChangeAspect="1" noChangeArrowheads="1"/>
+            <a:picLocks noChangeAspect="1"/>
           </p:cNvPicPr>
           <p:nvPr/>
         </p:nvPicPr>
@@ -9371,31 +9094,59 @@
               </a:ext>
             </a:extLst>
           </a:blip>
-          <a:srcRect/>
           <a:stretch>
             <a:fillRect/>
           </a:stretch>
         </p:blipFill>
-        <p:spPr bwMode="auto">
-          <a:xfrm>
-            <a:off x="4149725" y="729799"/>
-            <a:ext cx="7894922" cy="6052127"/>
+        <p:spPr>
+          <a:xfrm>
+            <a:off x="3995299" y="694758"/>
+            <a:ext cx="8197902" cy="6163242"/>
           </a:xfrm>
           <a:prstGeom prst="rect">
             <a:avLst/>
           </a:prstGeom>
-          <a:noFill/>
-          <a:extLst>
-            <a:ext uri="{909E8E84-426E-40DD-AFC4-6F175D3DCCD1}">
-              <a14:hiddenFill xmlns:a14="http://schemas.microsoft.com/office/drawing/2010/main">
-                <a:solidFill>
-                  <a:srgbClr val="FFFFFF"/>
-                </a:solidFill>
-              </a14:hiddenFill>
-            </a:ext>
-          </a:extLst>
         </p:spPr>
       </p:pic>
+      <p:sp>
+        <p:nvSpPr>
+          <p:cNvPr id="2" name="Title 1">
+            <a:extLst>
+              <a:ext uri="{FF2B5EF4-FFF2-40B4-BE49-F238E27FC236}">
+                <a16:creationId xmlns:a16="http://schemas.microsoft.com/office/drawing/2014/main" id="{1B85EE37-585C-E64B-A7B4-E9E8C734F5D4}"/>
+              </a:ext>
+            </a:extLst>
+          </p:cNvPr>
+          <p:cNvSpPr>
+            <a:spLocks noGrp="1"/>
+          </p:cNvSpPr>
+          <p:nvPr>
+            <p:ph type="title"/>
+          </p:nvPr>
+        </p:nvSpPr>
+        <p:spPr>
+          <a:xfrm>
+            <a:off x="192603" y="1195618"/>
+            <a:ext cx="3580327" cy="5394036"/>
+          </a:xfrm>
+        </p:spPr>
+        <p:txBody>
+          <a:bodyPr>
+            <a:normAutofit/>
+          </a:bodyPr>
+          <a:lstStyle/>
+          <a:p>
+            <a:r>
+              <a:rPr lang="en-US" sz="3400" dirty="0"/>
+              <a:t>The overall employment status by occupations in US: 2017</a:t>
+            </a:r>
+            <a:br>
+              <a:rPr lang="en-US" dirty="0"/>
+            </a:br>
+            <a:endParaRPr lang="en-US" dirty="0"/>
+          </a:p>
+        </p:txBody>
+      </p:sp>
       <p:sp>
         <p:nvSpPr>
           <p:cNvPr id="3" name="Left Arrow 2"/>
@@ -9404,7 +9155,7 @@
         </p:nvSpPr>
         <p:spPr>
           <a:xfrm>
-            <a:off x="8483642" y="4020943"/>
+            <a:off x="9227354" y="4045327"/>
             <a:ext cx="1249251" cy="296214"/>
           </a:xfrm>
           <a:prstGeom prst="leftArrow">

</xml_diff>

<commit_message>
read me, ppt, and summary updates
</commit_message>
<xml_diff>
--- a/Group_5_Presentation.pptx
+++ b/Group_5_Presentation.pptx
@@ -5845,7 +5845,7 @@
           <p:cNvPr id="4" name="TextBox 3">
             <a:extLst>
               <a:ext uri="{FF2B5EF4-FFF2-40B4-BE49-F238E27FC236}">
-                <a16:creationId xmlns="" xmlns:a16="http://schemas.microsoft.com/office/drawing/2014/main" id="{FCF9FFDB-DB25-4AFA-B506-312075D34380}"/>
+                <a16:creationId xmlns:a16="http://schemas.microsoft.com/office/drawing/2014/main" id="{FCF9FFDB-DB25-4AFA-B506-312075D34380}"/>
               </a:ext>
             </a:extLst>
           </p:cNvPr>
@@ -5887,13 +5887,8 @@
           <a:p>
             <a:r>
               <a:rPr lang="en-US" sz="2800" b="1" dirty="0"/>
-              <a:t>&amp; Lei </a:t>
-            </a:r>
-            <a:r>
-              <a:rPr lang="en-US" sz="2800" b="1" dirty="0" smtClean="0"/>
-              <a:t>Qin</a:t>
-            </a:r>
-            <a:endParaRPr lang="en-US" sz="2800" b="1" dirty="0"/>
+              <a:t>&amp; Lei Qin</a:t>
+            </a:r>
           </a:p>
         </p:txBody>
       </p:sp>
@@ -5932,7 +5927,7 @@
           <p:cNvPr id="2" name="Title 1">
             <a:extLst>
               <a:ext uri="{FF2B5EF4-FFF2-40B4-BE49-F238E27FC236}">
-                <a16:creationId xmlns="" xmlns:a16="http://schemas.microsoft.com/office/drawing/2014/main" id="{EC0D6666-CF76-4F9D-B356-8C4E5E1D8BE9}"/>
+                <a16:creationId xmlns:a16="http://schemas.microsoft.com/office/drawing/2014/main" id="{EC0D6666-CF76-4F9D-B356-8C4E5E1D8BE9}"/>
               </a:ext>
             </a:extLst>
           </p:cNvPr>
@@ -5957,15 +5952,7 @@
           <a:p>
             <a:r>
               <a:rPr lang="en-US" sz="3400" dirty="0"/>
-              <a:t>The employment status in Computer and Mathematical </a:t>
-            </a:r>
-            <a:r>
-              <a:rPr lang="en-US" sz="3400" dirty="0"/>
-              <a:t>occupations </a:t>
-            </a:r>
-            <a:r>
-              <a:rPr lang="en-US" sz="3400" dirty="0"/>
-              <a:t>in US: 2017</a:t>
+              <a:t>The employment status in Computer and Mathematical occupations in US: 2017</a:t>
             </a:r>
           </a:p>
         </p:txBody>
@@ -5975,7 +5962,7 @@
           <p:cNvPr id="4" name="Picture 3" descr="A screenshot of a cell phone&#10;&#10;Description automatically generated">
             <a:extLst>
               <a:ext uri="{FF2B5EF4-FFF2-40B4-BE49-F238E27FC236}">
-                <a16:creationId xmlns="" xmlns:a16="http://schemas.microsoft.com/office/drawing/2014/main" id="{86BFFD9D-DAAD-1B49-B1E8-4F81EF330F24}"/>
+                <a16:creationId xmlns:a16="http://schemas.microsoft.com/office/drawing/2014/main" id="{86BFFD9D-DAAD-1B49-B1E8-4F81EF330F24}"/>
               </a:ext>
             </a:extLst>
           </p:cNvPr>
@@ -6041,7 +6028,7 @@
           <p:cNvPr id="2" name="Title 1">
             <a:extLst>
               <a:ext uri="{FF2B5EF4-FFF2-40B4-BE49-F238E27FC236}">
-                <a16:creationId xmlns="" xmlns:a16="http://schemas.microsoft.com/office/drawing/2014/main" id="{1CFEA6E0-9345-1C43-9594-047B355EECDF}"/>
+                <a16:creationId xmlns:a16="http://schemas.microsoft.com/office/drawing/2014/main" id="{1CFEA6E0-9345-1C43-9594-047B355EECDF}"/>
               </a:ext>
             </a:extLst>
           </p:cNvPr>
@@ -6059,10 +6046,6 @@
           </a:bodyPr>
           <a:lstStyle/>
           <a:p>
-            <a:r>
-              <a:rPr lang="en-US" dirty="0"/>
-              <a:t/>
-            </a:r>
             <a:br>
               <a:rPr lang="en-US" dirty="0"/>
             </a:br>
@@ -6129,7 +6112,7 @@
           <p:cNvPr id="2" name="Title 1">
             <a:extLst>
               <a:ext uri="{FF2B5EF4-FFF2-40B4-BE49-F238E27FC236}">
-                <a16:creationId xmlns="" xmlns:a16="http://schemas.microsoft.com/office/drawing/2014/main" id="{27E5E4B7-0D24-1246-B992-4E761C8D9010}"/>
+                <a16:creationId xmlns:a16="http://schemas.microsoft.com/office/drawing/2014/main" id="{27E5E4B7-0D24-1246-B992-4E761C8D9010}"/>
               </a:ext>
             </a:extLst>
           </p:cNvPr>
@@ -6157,7 +6140,7 @@
           <p:cNvPr id="3" name="Content Placeholder 2">
             <a:extLst>
               <a:ext uri="{FF2B5EF4-FFF2-40B4-BE49-F238E27FC236}">
-                <a16:creationId xmlns="" xmlns:a16="http://schemas.microsoft.com/office/drawing/2014/main" id="{F68D2FE6-AC37-FA4F-B071-B1D2CB6CF5FE}"/>
+                <a16:creationId xmlns:a16="http://schemas.microsoft.com/office/drawing/2014/main" id="{F68D2FE6-AC37-FA4F-B071-B1D2CB6CF5FE}"/>
               </a:ext>
             </a:extLst>
           </p:cNvPr>
@@ -6188,12 +6171,8 @@
           <a:p>
             <a:pPr lvl="1"/>
             <a:r>
-              <a:rPr lang="en-US" dirty="0" smtClean="0"/>
-              <a:t>National </a:t>
-            </a:r>
-            <a:r>
               <a:rPr lang="en-US" dirty="0"/>
-              <a:t>level top 3: administrative support, sales and food preparation and serving</a:t>
+              <a:t>National level top 3: administrative support, sales and food preparation and serving</a:t>
             </a:r>
           </a:p>
           <a:p>
@@ -6226,21 +6205,8 @@
             <a:pPr lvl="1"/>
             <a:r>
               <a:rPr lang="en-US" dirty="0"/>
-              <a:t>Top </a:t>
-            </a:r>
-            <a:r>
-              <a:rPr lang="en-US" dirty="0" smtClean="0"/>
-              <a:t>3 job titles: </a:t>
-            </a:r>
-            <a:r>
-              <a:rPr lang="en-US" dirty="0"/>
-              <a:t>software developers, computer user support specialists and computer </a:t>
-            </a:r>
-            <a:r>
-              <a:rPr lang="en-US" dirty="0" smtClean="0"/>
-              <a:t>analysts</a:t>
-            </a:r>
-            <a:endParaRPr lang="en-US" dirty="0"/>
+              <a:t>Top 3 job titles: software developers, computer user support specialists and computer analysts</a:t>
+            </a:r>
           </a:p>
           <a:p>
             <a:pPr marL="457200" lvl="1" indent="0">
@@ -6269,14 +6235,6 @@
   <p:clrMapOvr>
     <a:masterClrMapping/>
   </p:clrMapOvr>
-  <mc:AlternateContent xmlns:mc="http://schemas.openxmlformats.org/markup-compatibility/2006" xmlns:p14="http://schemas.microsoft.com/office/powerpoint/2010/main">
-    <mc:Choice Requires="p14">
-      <p:transition spd="slow" p14:dur="2000"/>
-    </mc:Choice>
-    <mc:Fallback xmlns="">
-      <p:transition spd="slow"/>
-    </mc:Fallback>
-  </mc:AlternateContent>
 </p:sld>
 </file>
 
@@ -6302,7 +6260,7 @@
           <p:cNvPr id="2" name="Title 1">
             <a:extLst>
               <a:ext uri="{FF2B5EF4-FFF2-40B4-BE49-F238E27FC236}">
-                <a16:creationId xmlns="" xmlns:a16="http://schemas.microsoft.com/office/drawing/2014/main" id="{21D3167F-30A9-4F8D-99EE-386A1F094613}"/>
+                <a16:creationId xmlns:a16="http://schemas.microsoft.com/office/drawing/2014/main" id="{21D3167F-30A9-4F8D-99EE-386A1F094613}"/>
               </a:ext>
             </a:extLst>
           </p:cNvPr>
@@ -6330,7 +6288,7 @@
           <p:cNvPr id="3" name="Content Placeholder 2">
             <a:extLst>
               <a:ext uri="{FF2B5EF4-FFF2-40B4-BE49-F238E27FC236}">
-                <a16:creationId xmlns="" xmlns:a16="http://schemas.microsoft.com/office/drawing/2014/main" id="{571BA543-3A3F-43F0-957D-37B7A83B0853}"/>
+                <a16:creationId xmlns:a16="http://schemas.microsoft.com/office/drawing/2014/main" id="{571BA543-3A3F-43F0-957D-37B7A83B0853}"/>
               </a:ext>
             </a:extLst>
           </p:cNvPr>
@@ -6355,27 +6313,7 @@
           <a:p>
             <a:r>
               <a:rPr lang="en-US" sz="2400" dirty="0"/>
-              <a:t>Fastest YOY growth </a:t>
-            </a:r>
-            <a:r>
-              <a:rPr lang="en-US" sz="2400" dirty="0" smtClean="0"/>
-              <a:t>(‘</a:t>
-            </a:r>
-            <a:r>
-              <a:rPr lang="en-US" sz="2400" dirty="0" smtClean="0"/>
-              <a:t>17 </a:t>
-            </a:r>
-            <a:r>
-              <a:rPr lang="en-US" sz="2400" dirty="0"/>
-              <a:t>vs </a:t>
-            </a:r>
-            <a:r>
-              <a:rPr lang="en-US" sz="2400" dirty="0" smtClean="0"/>
-              <a:t>‘</a:t>
-            </a:r>
-            <a:r>
-              <a:rPr lang="en-US" sz="2400" dirty="0" smtClean="0"/>
-              <a:t>16) for Comp &amp; Math occupations: </a:t>
+              <a:t>Fastest YOY growth (‘17 vs ‘16) for Comp &amp; Math occupations: </a:t>
             </a:r>
             <a:r>
               <a:rPr lang="en-US" sz="2400" b="1" dirty="0"/>
@@ -6385,11 +6323,7 @@
           <a:p>
             <a:r>
               <a:rPr lang="en-US" sz="2400" dirty="0"/>
-              <a:t>Slowest </a:t>
-            </a:r>
-            <a:r>
-              <a:rPr lang="en-US" sz="2400" dirty="0" smtClean="0"/>
-              <a:t>YOY growth (‘17 vs ‘16) for Comp &amp; Math occupations : </a:t>
+              <a:t>Slowest YOY growth (‘17 vs ‘16) for Comp &amp; Math occupations : </a:t>
             </a:r>
             <a:r>
               <a:rPr lang="en-US" sz="2400" b="1" dirty="0"/>
@@ -6399,30 +6333,13 @@
           <a:p>
             <a:r>
               <a:rPr lang="en-US" sz="2400" dirty="0"/>
-              <a:t>Larger population </a:t>
-            </a:r>
-            <a:r>
-              <a:rPr lang="en-US" sz="2400" dirty="0" smtClean="0"/>
-              <a:t>size does not necessarily </a:t>
-            </a:r>
+              <a:t>Larger population size does not necessarily mean higher job growth </a:t>
+            </a:r>
+          </a:p>
+          <a:p>
             <a:r>
               <a:rPr lang="en-US" sz="2400" dirty="0"/>
-              <a:t>mean higher job </a:t>
-            </a:r>
-            <a:r>
-              <a:rPr lang="en-US" sz="2400" dirty="0"/>
-              <a:t>growth </a:t>
-            </a:r>
-            <a:endParaRPr lang="en-US" sz="2400" dirty="0" smtClean="0"/>
-          </a:p>
-          <a:p>
-            <a:r>
-              <a:rPr lang="en-US" sz="2400" dirty="0" smtClean="0"/>
-              <a:t>Occupation </a:t>
-            </a:r>
-            <a:r>
-              <a:rPr lang="en-US" sz="2400" dirty="0"/>
-              <a:t>with fastest YOY growth for 2017 vs 2016 : </a:t>
+              <a:t>Occupation with fastest YOY growth for 2017 vs 2016 : </a:t>
             </a:r>
             <a:r>
               <a:rPr lang="en-US" sz="2400" b="1" dirty="0"/>
@@ -6542,7 +6459,7 @@
           <p:cNvPr id="2" name="Title 1">
             <a:extLst>
               <a:ext uri="{FF2B5EF4-FFF2-40B4-BE49-F238E27FC236}">
-                <a16:creationId xmlns="" xmlns:a16="http://schemas.microsoft.com/office/drawing/2014/main" id="{D8975F0A-4727-47D2-96A8-DFAC0FBD6C91}"/>
+                <a16:creationId xmlns:a16="http://schemas.microsoft.com/office/drawing/2014/main" id="{D8975F0A-4727-47D2-96A8-DFAC0FBD6C91}"/>
               </a:ext>
             </a:extLst>
           </p:cNvPr>
@@ -6570,7 +6487,7 @@
           <p:cNvPr id="3" name="Content Placeholder 2">
             <a:extLst>
               <a:ext uri="{FF2B5EF4-FFF2-40B4-BE49-F238E27FC236}">
-                <a16:creationId xmlns="" xmlns:a16="http://schemas.microsoft.com/office/drawing/2014/main" id="{C69386F3-A2F7-4C59-B5D1-F22F1E51F196}"/>
+                <a16:creationId xmlns:a16="http://schemas.microsoft.com/office/drawing/2014/main" id="{C69386F3-A2F7-4C59-B5D1-F22F1E51F196}"/>
               </a:ext>
             </a:extLst>
           </p:cNvPr>
@@ -6654,7 +6571,7 @@
           <p:cNvPr id="2" name="Title 1">
             <a:extLst>
               <a:ext uri="{FF2B5EF4-FFF2-40B4-BE49-F238E27FC236}">
-                <a16:creationId xmlns="" xmlns:a16="http://schemas.microsoft.com/office/drawing/2014/main" id="{E1C9EF35-DC7C-428F-A8C6-930DEFB1E1DB}"/>
+                <a16:creationId xmlns:a16="http://schemas.microsoft.com/office/drawing/2014/main" id="{E1C9EF35-DC7C-428F-A8C6-930DEFB1E1DB}"/>
               </a:ext>
             </a:extLst>
           </p:cNvPr>
@@ -6682,7 +6599,7 @@
           <p:cNvPr id="3" name="Content Placeholder 2">
             <a:extLst>
               <a:ext uri="{FF2B5EF4-FFF2-40B4-BE49-F238E27FC236}">
-                <a16:creationId xmlns="" xmlns:a16="http://schemas.microsoft.com/office/drawing/2014/main" id="{1B82C285-6A5A-45FC-B1D5-1D0786CBCFB5}"/>
+                <a16:creationId xmlns:a16="http://schemas.microsoft.com/office/drawing/2014/main" id="{1B82C285-6A5A-45FC-B1D5-1D0786CBCFB5}"/>
               </a:ext>
             </a:extLst>
           </p:cNvPr>
@@ -6761,7 +6678,7 @@
           <p:cNvPr id="2" name="Title 1">
             <a:extLst>
               <a:ext uri="{FF2B5EF4-FFF2-40B4-BE49-F238E27FC236}">
-                <a16:creationId xmlns="" xmlns:a16="http://schemas.microsoft.com/office/drawing/2014/main" id="{55A6334A-68E7-42D4-919A-0C62BE53DBB2}"/>
+                <a16:creationId xmlns:a16="http://schemas.microsoft.com/office/drawing/2014/main" id="{55A6334A-68E7-42D4-919A-0C62BE53DBB2}"/>
               </a:ext>
             </a:extLst>
           </p:cNvPr>
@@ -6789,10 +6706,6 @@
               <a:rPr lang="en-US" sz="6700" dirty="0"/>
               <a:t>Thank you!</a:t>
             </a:r>
-            <a:r>
-              <a:rPr lang="en-US" dirty="0"/>
-              <a:t/>
-            </a:r>
             <a:br>
               <a:rPr lang="en-US" dirty="0"/>
             </a:br>
@@ -6805,7 +6718,7 @@
           <p:cNvPr id="3" name="Content Placeholder 2">
             <a:extLst>
               <a:ext uri="{FF2B5EF4-FFF2-40B4-BE49-F238E27FC236}">
-                <a16:creationId xmlns="" xmlns:a16="http://schemas.microsoft.com/office/drawing/2014/main" id="{1C25BB28-A4EC-414D-859C-C7A0FCD1F980}"/>
+                <a16:creationId xmlns:a16="http://schemas.microsoft.com/office/drawing/2014/main" id="{1C25BB28-A4EC-414D-859C-C7A0FCD1F980}"/>
               </a:ext>
             </a:extLst>
           </p:cNvPr>
@@ -6873,7 +6786,7 @@
           <p:cNvPr id="2" name="Title 1">
             <a:extLst>
               <a:ext uri="{FF2B5EF4-FFF2-40B4-BE49-F238E27FC236}">
-                <a16:creationId xmlns="" xmlns:a16="http://schemas.microsoft.com/office/drawing/2014/main" id="{41B5C587-4962-4E00-A54B-F8B9FE251918}"/>
+                <a16:creationId xmlns:a16="http://schemas.microsoft.com/office/drawing/2014/main" id="{41B5C587-4962-4E00-A54B-F8B9FE251918}"/>
               </a:ext>
             </a:extLst>
           </p:cNvPr>
@@ -6901,7 +6814,7 @@
           <p:cNvPr id="3" name="Content Placeholder 2">
             <a:extLst>
               <a:ext uri="{FF2B5EF4-FFF2-40B4-BE49-F238E27FC236}">
-                <a16:creationId xmlns="" xmlns:a16="http://schemas.microsoft.com/office/drawing/2014/main" id="{129B7FB5-54B8-4545-A8C7-1D4B4C033F1E}"/>
+                <a16:creationId xmlns:a16="http://schemas.microsoft.com/office/drawing/2014/main" id="{129B7FB5-54B8-4545-A8C7-1D4B4C033F1E}"/>
               </a:ext>
             </a:extLst>
           </p:cNvPr>
@@ -6941,13 +6854,8 @@
             </a:pPr>
             <a:r>
               <a:rPr lang="en-US" dirty="0"/>
-              <a:t>	1. Which states have the fastest growing job market for computer and mathematical </a:t>
-            </a:r>
-            <a:r>
-              <a:rPr lang="en-US" dirty="0" smtClean="0"/>
-              <a:t>occupations?</a:t>
-            </a:r>
-            <a:endParaRPr lang="en-US" dirty="0"/>
+              <a:t>	1. Which states have the fastest growing job market for computer and mathematical occupations?</a:t>
+            </a:r>
           </a:p>
           <a:p>
             <a:pPr marL="0" indent="0" algn="r">
@@ -6973,15 +6881,7 @@
             </a:pPr>
             <a:r>
               <a:rPr lang="en-US" dirty="0"/>
-              <a:t>	4. How do computer and mathematical </a:t>
-            </a:r>
-            <a:r>
-              <a:rPr lang="en-US" dirty="0" smtClean="0"/>
-              <a:t>occupations </a:t>
-            </a:r>
-            <a:r>
-              <a:rPr lang="en-US" dirty="0"/>
-              <a:t>stack up against other occupation types? </a:t>
+              <a:t>	4. How do computer and mathematical occupations stack up against other occupation types? </a:t>
             </a:r>
           </a:p>
           <a:p>
@@ -7048,7 +6948,7 @@
           <p:cNvPr id="2" name="Title 1">
             <a:extLst>
               <a:ext uri="{FF2B5EF4-FFF2-40B4-BE49-F238E27FC236}">
-                <a16:creationId xmlns="" xmlns:a16="http://schemas.microsoft.com/office/drawing/2014/main" id="{B01FBC95-86CC-4C5D-80F0-CF41A33B1E9F}"/>
+                <a16:creationId xmlns:a16="http://schemas.microsoft.com/office/drawing/2014/main" id="{B01FBC95-86CC-4C5D-80F0-CF41A33B1E9F}"/>
               </a:ext>
             </a:extLst>
           </p:cNvPr>
@@ -7076,7 +6976,7 @@
           <p:cNvPr id="3" name="Content Placeholder 2">
             <a:extLst>
               <a:ext uri="{FF2B5EF4-FFF2-40B4-BE49-F238E27FC236}">
-                <a16:creationId xmlns="" xmlns:a16="http://schemas.microsoft.com/office/drawing/2014/main" id="{CACC8578-D28C-470E-8EBE-3E9A3C6434E3}"/>
+                <a16:creationId xmlns:a16="http://schemas.microsoft.com/office/drawing/2014/main" id="{CACC8578-D28C-470E-8EBE-3E9A3C6434E3}"/>
               </a:ext>
             </a:extLst>
           </p:cNvPr>
@@ -7114,7 +7014,7 @@
                 <a:hlinkClick r:id="rId2">
                   <a:extLst>
                     <a:ext uri="{A12FA001-AC4F-418D-AE19-62706E023703}">
-                      <ahyp:hlinkClr xmlns="" xmlns:ahyp="http://schemas.microsoft.com/office/drawing/2018/hyperlinkcolor" val="tx"/>
+                      <ahyp:hlinkClr xmlns:ahyp="http://schemas.microsoft.com/office/drawing/2018/hyperlinkcolor" val="tx"/>
                     </a:ext>
                   </a:extLst>
                 </a:hlinkClick>
@@ -7157,7 +7057,7 @@
                 <a:hlinkClick r:id="rId3">
                   <a:extLst>
                     <a:ext uri="{A12FA001-AC4F-418D-AE19-62706E023703}">
-                      <ahyp:hlinkClr xmlns="" xmlns:ahyp="http://schemas.microsoft.com/office/drawing/2018/hyperlinkcolor" val="tx"/>
+                      <ahyp:hlinkClr xmlns:ahyp="http://schemas.microsoft.com/office/drawing/2018/hyperlinkcolor" val="tx"/>
                     </a:ext>
                   </a:extLst>
                 </a:hlinkClick>
@@ -7190,7 +7090,7 @@
           <p:cNvPr id="4" name="Picture 3">
             <a:extLst>
               <a:ext uri="{FF2B5EF4-FFF2-40B4-BE49-F238E27FC236}">
-                <a16:creationId xmlns="" xmlns:a16="http://schemas.microsoft.com/office/drawing/2014/main" id="{E7D53E29-B383-4B9D-A554-11B128DFEE9B}"/>
+                <a16:creationId xmlns:a16="http://schemas.microsoft.com/office/drawing/2014/main" id="{E7D53E29-B383-4B9D-A554-11B128DFEE9B}"/>
               </a:ext>
             </a:extLst>
           </p:cNvPr>
@@ -7220,7 +7120,7 @@
           <p:cNvPr id="6" name="Picture 5">
             <a:extLst>
               <a:ext uri="{FF2B5EF4-FFF2-40B4-BE49-F238E27FC236}">
-                <a16:creationId xmlns="" xmlns:a16="http://schemas.microsoft.com/office/drawing/2014/main" id="{064340ED-E940-4A96-89BA-D2EE55992785}"/>
+                <a16:creationId xmlns:a16="http://schemas.microsoft.com/office/drawing/2014/main" id="{064340ED-E940-4A96-89BA-D2EE55992785}"/>
               </a:ext>
             </a:extLst>
           </p:cNvPr>
@@ -7286,7 +7186,7 @@
           <p:cNvPr id="3" name="Content Placeholder 2">
             <a:extLst>
               <a:ext uri="{FF2B5EF4-FFF2-40B4-BE49-F238E27FC236}">
-                <a16:creationId xmlns="" xmlns:a16="http://schemas.microsoft.com/office/drawing/2014/main" id="{75897B1C-3F8F-4B5D-8723-E5115AF5882A}"/>
+                <a16:creationId xmlns:a16="http://schemas.microsoft.com/office/drawing/2014/main" id="{75897B1C-3F8F-4B5D-8723-E5115AF5882A}"/>
               </a:ext>
             </a:extLst>
           </p:cNvPr>
@@ -7314,15 +7214,7 @@
             </a:pPr>
             <a:r>
               <a:rPr lang="en-US" sz="2600" dirty="0"/>
-              <a:t>States chosen based on fastest YOY growth for 2017 vs </a:t>
-            </a:r>
-            <a:r>
-              <a:rPr lang="en-US" sz="2600" dirty="0" smtClean="0"/>
-              <a:t>2016 for Computer and Mathematical Occupations.  </a:t>
-            </a:r>
-            <a:r>
-              <a:rPr lang="en-US" sz="2600" dirty="0"/>
-              <a:t>Included US as a comparison point</a:t>
+              <a:t>States chosen based on fastest YOY growth for 2017 vs 2016 for Computer and Mathematical Occupations.  Included US as a comparison point</a:t>
             </a:r>
           </a:p>
           <a:p>
@@ -7334,46 +7226,13 @@
           <a:p>
             <a:r>
               <a:rPr lang="en-US" dirty="0"/>
-              <a:t>Top 3 </a:t>
-            </a:r>
-            <a:r>
-              <a:rPr lang="en-US" dirty="0" smtClean="0"/>
-              <a:t>states/territories </a:t>
-            </a:r>
+              <a:t>Top 3 states/territories are Guam, Montana, and Utah.  Both Guam and Montana show a volatile job market from at least 2015-2017</a:t>
+            </a:r>
+          </a:p>
+          <a:p>
             <a:r>
               <a:rPr lang="en-US" dirty="0"/>
-              <a:t>are Guam, Montana, and Utah.  Both Guam and Montana show a volatile job market from </a:t>
-            </a:r>
-            <a:r>
-              <a:rPr lang="en-US" dirty="0" smtClean="0"/>
-              <a:t>at least 2015-2017</a:t>
-            </a:r>
-            <a:endParaRPr lang="en-US" dirty="0"/>
-          </a:p>
-          <a:p>
-            <a:r>
-              <a:rPr lang="en-US" dirty="0"/>
-              <a:t>Utah </a:t>
-            </a:r>
-            <a:r>
-              <a:rPr lang="en-US" dirty="0" smtClean="0"/>
-              <a:t>did </a:t>
-            </a:r>
-            <a:r>
-              <a:rPr lang="en-US" dirty="0"/>
-              <a:t>not grow as much as it did in 2016, like the </a:t>
-            </a:r>
-            <a:r>
-              <a:rPr lang="en-US" dirty="0" smtClean="0"/>
-              <a:t>total</a:t>
-            </a:r>
-            <a:r>
-              <a:rPr lang="en-US" dirty="0" smtClean="0"/>
-              <a:t> </a:t>
-            </a:r>
-            <a:r>
-              <a:rPr lang="en-US" dirty="0"/>
-              <a:t>US, but continued to experience a strong job market</a:t>
+              <a:t>Utah did not grow as much as it did in 2016, like the total US, but continued to experience a strong job market</a:t>
             </a:r>
           </a:p>
           <a:p>
@@ -7410,10 +7269,10 @@
       </p:pic>
       <p:pic>
         <p:nvPicPr>
-          <p:cNvPr id="5" name="Picture 12">
+          <p:cNvPr id="1026" name="Picture 2">
             <a:extLst>
               <a:ext uri="{FF2B5EF4-FFF2-40B4-BE49-F238E27FC236}">
-                <a16:creationId xmlns="" xmlns:a16="http://schemas.microsoft.com/office/drawing/2014/main" id="{6F0AC7CD-13B1-49CA-A210-0FEA7F648B7C}"/>
+                <a16:creationId xmlns:a16="http://schemas.microsoft.com/office/drawing/2014/main" id="{D8C64A6C-BD40-4A64-B91F-E20F1390B313}"/>
               </a:ext>
             </a:extLst>
           </p:cNvPr>
@@ -7437,8 +7296,8 @@
         </p:blipFill>
         <p:spPr bwMode="auto">
           <a:xfrm>
-            <a:off x="3902298" y="946601"/>
-            <a:ext cx="8102057" cy="3314700"/>
+            <a:off x="3609492" y="737536"/>
+            <a:ext cx="8534400" cy="3314700"/>
           </a:xfrm>
           <a:prstGeom prst="rect">
             <a:avLst/>
@@ -7490,7 +7349,7 @@
           <p:cNvPr id="5" name="Content Placeholder 2">
             <a:extLst>
               <a:ext uri="{FF2B5EF4-FFF2-40B4-BE49-F238E27FC236}">
-                <a16:creationId xmlns="" xmlns:a16="http://schemas.microsoft.com/office/drawing/2014/main" id="{75897B1C-3F8F-4B5D-8723-E5115AF5882A}"/>
+                <a16:creationId xmlns:a16="http://schemas.microsoft.com/office/drawing/2014/main" id="{75897B1C-3F8F-4B5D-8723-E5115AF5882A}"/>
               </a:ext>
             </a:extLst>
           </p:cNvPr>
@@ -7682,44 +7541,19 @@
             </a:pPr>
             <a:r>
               <a:rPr lang="en-US" sz="2800" dirty="0"/>
-              <a:t>States chosen based on </a:t>
-            </a:r>
-            <a:r>
-              <a:rPr lang="en-US" sz="2800" dirty="0" smtClean="0"/>
-              <a:t>slowest </a:t>
-            </a:r>
-            <a:r>
-              <a:rPr lang="en-US" sz="2800" dirty="0"/>
-              <a:t>YOY growth for 2017 vs 2016 for Computer and Mathematical Occupations.  Included US as a comparison point</a:t>
-            </a:r>
-          </a:p>
-          <a:p>
-            <a:r>
-              <a:rPr lang="en-US" sz="2400" dirty="0" smtClean="0"/>
-              <a:t>The </a:t>
-            </a:r>
+              <a:t>States chosen based on slowest YOY growth for 2017 vs 2016 for Computer and Mathematical Occupations.  Included US as a comparison point</a:t>
+            </a:r>
+          </a:p>
+          <a:p>
             <a:r>
               <a:rPr lang="en-US" sz="2400" dirty="0"/>
-              <a:t>three bottom states are Louisiana, New Mexico, and Minnesota.  All three of these states experienced growth in 2016.  Out of the three, New Mexico experienced the largest % </a:t>
-            </a:r>
-            <a:r>
-              <a:rPr lang="en-US" sz="2400" dirty="0" smtClean="0"/>
-              <a:t>decline from 2016 to 2017</a:t>
-            </a:r>
-            <a:endParaRPr lang="en-US" sz="2400" dirty="0"/>
+              <a:t>The three bottom states are Louisiana, New Mexico, and Minnesota.  All three of these states experienced growth in 2016.  Out of the three, New Mexico experienced the largest % decline from 2016 to 2017</a:t>
+            </a:r>
           </a:p>
           <a:p>
             <a:r>
               <a:rPr lang="en-US" sz="2400" dirty="0"/>
-              <a:t>All three of these </a:t>
-            </a:r>
-            <a:r>
-              <a:rPr lang="en-US" sz="2400" dirty="0" smtClean="0"/>
-              <a:t>states </a:t>
-            </a:r>
-            <a:r>
-              <a:rPr lang="en-US" sz="2400" dirty="0"/>
-              <a:t>outgrew total US in 2014, but did not exceed overall US growth in 2015, 2016, or 2017</a:t>
+              <a:t>All three of these states outgrew total US in 2014, but did not exceed overall US growth in 2015, 2016, or 2017</a:t>
             </a:r>
             <a:endParaRPr lang="en-US" dirty="0"/>
           </a:p>
@@ -7744,8 +7578,8 @@
         </p:blipFill>
         <p:spPr>
           <a:xfrm>
-            <a:off x="115909" y="2038000"/>
-            <a:ext cx="3451538" cy="1070721"/>
+            <a:off x="115909" y="1946246"/>
+            <a:ext cx="3451538" cy="1162476"/>
           </a:xfrm>
           <a:prstGeom prst="rect">
             <a:avLst/>
@@ -7754,10 +7588,10 @@
       </p:pic>
       <p:pic>
         <p:nvPicPr>
-          <p:cNvPr id="6" name="Picture 10">
+          <p:cNvPr id="2050" name="Picture 2">
             <a:extLst>
               <a:ext uri="{FF2B5EF4-FFF2-40B4-BE49-F238E27FC236}">
-                <a16:creationId xmlns="" xmlns:a16="http://schemas.microsoft.com/office/drawing/2014/main" id="{C7E7A439-E819-4DB7-B4F7-A25B98A49CCC}"/>
+                <a16:creationId xmlns:a16="http://schemas.microsoft.com/office/drawing/2014/main" id="{B626FDCB-06F6-43F3-A509-7A6C9899E5E6}"/>
               </a:ext>
             </a:extLst>
           </p:cNvPr>
@@ -7781,8 +7615,8 @@
         </p:blipFill>
         <p:spPr bwMode="auto">
           <a:xfrm>
-            <a:off x="3928056" y="916011"/>
-            <a:ext cx="8076300" cy="3314700"/>
+            <a:off x="3714750" y="755650"/>
+            <a:ext cx="8477250" cy="3314700"/>
           </a:xfrm>
           <a:prstGeom prst="rect">
             <a:avLst/>
@@ -7834,7 +7668,7 @@
           <p:cNvPr id="3" name="Content Placeholder 2">
             <a:extLst>
               <a:ext uri="{FF2B5EF4-FFF2-40B4-BE49-F238E27FC236}">
-                <a16:creationId xmlns="" xmlns:a16="http://schemas.microsoft.com/office/drawing/2014/main" id="{A1BF3F66-EBAC-4059-95DC-84F0A2D0D9F8}"/>
+                <a16:creationId xmlns:a16="http://schemas.microsoft.com/office/drawing/2014/main" id="{A1BF3F66-EBAC-4059-95DC-84F0A2D0D9F8}"/>
               </a:ext>
             </a:extLst>
           </p:cNvPr>
@@ -7866,15 +7700,7 @@
             <a:pPr lvl="1"/>
             <a:r>
               <a:rPr lang="en-US" dirty="0"/>
-              <a:t>A</a:t>
-            </a:r>
-            <a:r>
-              <a:rPr lang="en-US" dirty="0" smtClean="0"/>
-              <a:t> </a:t>
-            </a:r>
-            <a:r>
-              <a:rPr lang="en-US" dirty="0"/>
-              <a:t>larger population did not necessarily translate to higher job growth in this case</a:t>
+              <a:t>A larger population did not necessarily translate to higher job growth in this case</a:t>
             </a:r>
           </a:p>
           <a:p>
@@ -7891,7 +7717,7 @@
           <p:cNvPr id="1028" name="Picture 4">
             <a:extLst>
               <a:ext uri="{FF2B5EF4-FFF2-40B4-BE49-F238E27FC236}">
-                <a16:creationId xmlns="" xmlns:a16="http://schemas.microsoft.com/office/drawing/2014/main" id="{642F8360-CC0D-4DD9-9C82-369B6108FA21}"/>
+                <a16:creationId xmlns:a16="http://schemas.microsoft.com/office/drawing/2014/main" id="{642F8360-CC0D-4DD9-9C82-369B6108FA21}"/>
               </a:ext>
             </a:extLst>
           </p:cNvPr>
@@ -8016,7 +7842,7 @@
           <p:cNvPr id="2" name="Title 1">
             <a:extLst>
               <a:ext uri="{FF2B5EF4-FFF2-40B4-BE49-F238E27FC236}">
-                <a16:creationId xmlns="" xmlns:a16="http://schemas.microsoft.com/office/drawing/2014/main" id="{AB68570A-62BD-4471-B097-C694410375A6}"/>
+                <a16:creationId xmlns:a16="http://schemas.microsoft.com/office/drawing/2014/main" id="{AB68570A-62BD-4471-B097-C694410375A6}"/>
               </a:ext>
             </a:extLst>
           </p:cNvPr>
@@ -8041,10 +7867,10 @@
       </p:sp>
       <p:pic>
         <p:nvPicPr>
-          <p:cNvPr id="5" name="Content Placeholder 4">
+          <p:cNvPr id="8" name="Content Placeholder 7">
             <a:extLst>
               <a:ext uri="{FF2B5EF4-FFF2-40B4-BE49-F238E27FC236}">
-                <a16:creationId xmlns="" xmlns:a16="http://schemas.microsoft.com/office/drawing/2014/main" id="{EEB80261-BFDA-43BA-9A2B-7566F24FD572}"/>
+                <a16:creationId xmlns:a16="http://schemas.microsoft.com/office/drawing/2014/main" id="{BFBD1934-FD17-47DC-A5FD-FDD1A2C3355D}"/>
               </a:ext>
             </a:extLst>
           </p:cNvPr>
@@ -8069,17 +7895,17 @@
         </p:blipFill>
         <p:spPr>
           <a:xfrm>
-            <a:off x="0" y="2849418"/>
-            <a:ext cx="6012874" cy="4008582"/>
+            <a:off x="0" y="2276304"/>
+            <a:ext cx="5996869" cy="3997912"/>
           </a:xfrm>
         </p:spPr>
       </p:pic>
       <p:pic>
         <p:nvPicPr>
-          <p:cNvPr id="7" name="Picture 6">
+          <p:cNvPr id="10" name="Picture 9">
             <a:extLst>
               <a:ext uri="{FF2B5EF4-FFF2-40B4-BE49-F238E27FC236}">
-                <a16:creationId xmlns="" xmlns:a16="http://schemas.microsoft.com/office/drawing/2014/main" id="{AD43CADE-D702-44C9-9494-04A14FD16E34}"/>
+                <a16:creationId xmlns:a16="http://schemas.microsoft.com/office/drawing/2014/main" id="{1989F6F7-5E58-4DB3-8230-2E37CE708500}"/>
               </a:ext>
             </a:extLst>
           </p:cNvPr>
@@ -8102,8 +7928,8 @@
         </p:blipFill>
         <p:spPr>
           <a:xfrm>
-            <a:off x="6012874" y="2849418"/>
-            <a:ext cx="6012873" cy="4008582"/>
+            <a:off x="5996869" y="2276304"/>
+            <a:ext cx="6133571" cy="4089047"/>
           </a:xfrm>
           <a:prstGeom prst="rect">
             <a:avLst/>
@@ -8145,7 +7971,7 @@
           <p:cNvPr id="2" name="Title 1">
             <a:extLst>
               <a:ext uri="{FF2B5EF4-FFF2-40B4-BE49-F238E27FC236}">
-                <a16:creationId xmlns="" xmlns:a16="http://schemas.microsoft.com/office/drawing/2014/main" id="{A596BA33-7754-4852-A943-2BF56BC5ACEE}"/>
+                <a16:creationId xmlns:a16="http://schemas.microsoft.com/office/drawing/2014/main" id="{A596BA33-7754-4852-A943-2BF56BC5ACEE}"/>
               </a:ext>
             </a:extLst>
           </p:cNvPr>
@@ -8178,7 +8004,7 @@
           <p:cNvPr id="4" name="Content Placeholder 3">
             <a:extLst>
               <a:ext uri="{FF2B5EF4-FFF2-40B4-BE49-F238E27FC236}">
-                <a16:creationId xmlns="" xmlns:a16="http://schemas.microsoft.com/office/drawing/2014/main" id="{491C927E-30F3-4185-BE20-0B6D3C5A74A6}"/>
+                <a16:creationId xmlns:a16="http://schemas.microsoft.com/office/drawing/2014/main" id="{491C927E-30F3-4185-BE20-0B6D3C5A74A6}"/>
               </a:ext>
             </a:extLst>
           </p:cNvPr>
@@ -8208,21 +8034,21 @@
                 <a:gridCol w="1647559">
                   <a:extLst>
                     <a:ext uri="{9D8B030D-6E8A-4147-A177-3AD203B41FA5}">
-                      <a16:colId xmlns="" xmlns:a16="http://schemas.microsoft.com/office/drawing/2014/main" val="957085690"/>
+                      <a16:colId xmlns:a16="http://schemas.microsoft.com/office/drawing/2014/main" val="957085690"/>
                     </a:ext>
                   </a:extLst>
                 </a:gridCol>
                 <a:gridCol w="1647559">
                   <a:extLst>
                     <a:ext uri="{9D8B030D-6E8A-4147-A177-3AD203B41FA5}">
-                      <a16:colId xmlns="" xmlns:a16="http://schemas.microsoft.com/office/drawing/2014/main" val="3984160696"/>
+                      <a16:colId xmlns:a16="http://schemas.microsoft.com/office/drawing/2014/main" val="3984160696"/>
                     </a:ext>
                   </a:extLst>
                 </a:gridCol>
                 <a:gridCol w="1924582">
                   <a:extLst>
                     <a:ext uri="{9D8B030D-6E8A-4147-A177-3AD203B41FA5}">
-                      <a16:colId xmlns="" xmlns:a16="http://schemas.microsoft.com/office/drawing/2014/main" val="3944266915"/>
+                      <a16:colId xmlns:a16="http://schemas.microsoft.com/office/drawing/2014/main" val="3944266915"/>
                     </a:ext>
                   </a:extLst>
                 </a:gridCol>
@@ -8320,7 +8146,7 @@
                 </a:tc>
                 <a:extLst>
                   <a:ext uri="{0D108BD9-81ED-4DB2-BD59-A6C34878D82A}">
-                    <a16:rowId xmlns="" xmlns:a16="http://schemas.microsoft.com/office/drawing/2014/main" val="3101018803"/>
+                    <a16:rowId xmlns:a16="http://schemas.microsoft.com/office/drawing/2014/main" val="3101018803"/>
                   </a:ext>
                 </a:extLst>
               </a:tr>
@@ -8405,7 +8231,7 @@
                 </a:tc>
                 <a:extLst>
                   <a:ext uri="{0D108BD9-81ED-4DB2-BD59-A6C34878D82A}">
-                    <a16:rowId xmlns="" xmlns:a16="http://schemas.microsoft.com/office/drawing/2014/main" val="3649961185"/>
+                    <a16:rowId xmlns:a16="http://schemas.microsoft.com/office/drawing/2014/main" val="3649961185"/>
                   </a:ext>
                 </a:extLst>
               </a:tr>
@@ -8490,7 +8316,7 @@
                 </a:tc>
                 <a:extLst>
                   <a:ext uri="{0D108BD9-81ED-4DB2-BD59-A6C34878D82A}">
-                    <a16:rowId xmlns="" xmlns:a16="http://schemas.microsoft.com/office/drawing/2014/main" val="3566758617"/>
+                    <a16:rowId xmlns:a16="http://schemas.microsoft.com/office/drawing/2014/main" val="3566758617"/>
                   </a:ext>
                 </a:extLst>
               </a:tr>
@@ -8575,7 +8401,7 @@
                 </a:tc>
                 <a:extLst>
                   <a:ext uri="{0D108BD9-81ED-4DB2-BD59-A6C34878D82A}">
-                    <a16:rowId xmlns="" xmlns:a16="http://schemas.microsoft.com/office/drawing/2014/main" val="2431465096"/>
+                    <a16:rowId xmlns:a16="http://schemas.microsoft.com/office/drawing/2014/main" val="2431465096"/>
                   </a:ext>
                 </a:extLst>
               </a:tr>
@@ -8660,7 +8486,7 @@
                 </a:tc>
                 <a:extLst>
                   <a:ext uri="{0D108BD9-81ED-4DB2-BD59-A6C34878D82A}">
-                    <a16:rowId xmlns="" xmlns:a16="http://schemas.microsoft.com/office/drawing/2014/main" val="1755834529"/>
+                    <a16:rowId xmlns:a16="http://schemas.microsoft.com/office/drawing/2014/main" val="1755834529"/>
                   </a:ext>
                 </a:extLst>
               </a:tr>
@@ -8745,7 +8571,7 @@
                 </a:tc>
                 <a:extLst>
                   <a:ext uri="{0D108BD9-81ED-4DB2-BD59-A6C34878D82A}">
-                    <a16:rowId xmlns="" xmlns:a16="http://schemas.microsoft.com/office/drawing/2014/main" val="4151097572"/>
+                    <a16:rowId xmlns:a16="http://schemas.microsoft.com/office/drawing/2014/main" val="4151097572"/>
                   </a:ext>
                 </a:extLst>
               </a:tr>
@@ -8830,7 +8656,7 @@
                 </a:tc>
                 <a:extLst>
                   <a:ext uri="{0D108BD9-81ED-4DB2-BD59-A6C34878D82A}">
-                    <a16:rowId xmlns="" xmlns:a16="http://schemas.microsoft.com/office/drawing/2014/main" val="1023807493"/>
+                    <a16:rowId xmlns:a16="http://schemas.microsoft.com/office/drawing/2014/main" val="1023807493"/>
                   </a:ext>
                 </a:extLst>
               </a:tr>
@@ -8921,7 +8747,7 @@
                 </a:tc>
                 <a:extLst>
                   <a:ext uri="{0D108BD9-81ED-4DB2-BD59-A6C34878D82A}">
-                    <a16:rowId xmlns="" xmlns:a16="http://schemas.microsoft.com/office/drawing/2014/main" val="1166867636"/>
+                    <a16:rowId xmlns:a16="http://schemas.microsoft.com/office/drawing/2014/main" val="1166867636"/>
                   </a:ext>
                 </a:extLst>
               </a:tr>
@@ -9012,7 +8838,7 @@
                 </a:tc>
                 <a:extLst>
                   <a:ext uri="{0D108BD9-81ED-4DB2-BD59-A6C34878D82A}">
-                    <a16:rowId xmlns="" xmlns:a16="http://schemas.microsoft.com/office/drawing/2014/main" val="4172888325"/>
+                    <a16:rowId xmlns:a16="http://schemas.microsoft.com/office/drawing/2014/main" val="4172888325"/>
                   </a:ext>
                 </a:extLst>
               </a:tr>
@@ -9025,7 +8851,7 @@
           <p:cNvPr id="5" name="TextBox 4">
             <a:extLst>
               <a:ext uri="{FF2B5EF4-FFF2-40B4-BE49-F238E27FC236}">
-                <a16:creationId xmlns="" xmlns:a16="http://schemas.microsoft.com/office/drawing/2014/main" id="{4E286D4F-4DA4-47A6-B4A1-69C59C04C373}"/>
+                <a16:creationId xmlns:a16="http://schemas.microsoft.com/office/drawing/2014/main" id="{4E286D4F-4DA4-47A6-B4A1-69C59C04C373}"/>
               </a:ext>
             </a:extLst>
           </p:cNvPr>
@@ -9088,15 +8914,7 @@
             </a:pPr>
             <a:r>
               <a:rPr lang="en-US" dirty="0"/>
-              <a:t>Both Computer and Mathematical Occupations and All Occupations showed steady growth. However, Computer and Mathematical Occupations had consistently higher growth </a:t>
-            </a:r>
-            <a:r>
-              <a:rPr lang="en-US" dirty="0" smtClean="0"/>
-              <a:t>than </a:t>
-            </a:r>
-            <a:r>
-              <a:rPr lang="en-US" dirty="0"/>
-              <a:t>All Occupations </a:t>
+              <a:t>Both Computer and Mathematical Occupations and All Occupations showed steady growth. However, Computer and Mathematical Occupations had consistently higher growth than All Occupations </a:t>
             </a:r>
           </a:p>
           <a:p>
@@ -9160,7 +8978,7 @@
           <p:cNvPr id="5" name="Picture 4" descr="A screenshot of a cell phone&#10;&#10;Description automatically generated">
             <a:extLst>
               <a:ext uri="{FF2B5EF4-FFF2-40B4-BE49-F238E27FC236}">
-                <a16:creationId xmlns="" xmlns:a16="http://schemas.microsoft.com/office/drawing/2014/main" id="{5DF69AB2-A8CD-0444-9BE9-B09AE4043E5C}"/>
+                <a16:creationId xmlns:a16="http://schemas.microsoft.com/office/drawing/2014/main" id="{5DF69AB2-A8CD-0444-9BE9-B09AE4043E5C}"/>
               </a:ext>
             </a:extLst>
           </p:cNvPr>
@@ -9196,7 +9014,7 @@
           <p:cNvPr id="2" name="Title 1">
             <a:extLst>
               <a:ext uri="{FF2B5EF4-FFF2-40B4-BE49-F238E27FC236}">
-                <a16:creationId xmlns="" xmlns:a16="http://schemas.microsoft.com/office/drawing/2014/main" id="{1B85EE37-585C-E64B-A7B4-E9E8C734F5D4}"/>
+                <a16:creationId xmlns:a16="http://schemas.microsoft.com/office/drawing/2014/main" id="{1B85EE37-585C-E64B-A7B4-E9E8C734F5D4}"/>
               </a:ext>
             </a:extLst>
           </p:cNvPr>
@@ -9222,10 +9040,6 @@
             <a:r>
               <a:rPr lang="en-US" sz="3400" dirty="0"/>
               <a:t>The overall employment status by occupations in US: 2017</a:t>
-            </a:r>
-            <a:r>
-              <a:rPr lang="en-US" dirty="0"/>
-              <a:t/>
             </a:r>
             <a:br>
               <a:rPr lang="en-US" dirty="0"/>

</xml_diff>